<commit_message>
ch 7 and 8 updates
</commit_message>
<xml_diff>
--- a/Fall2018 Lecture Notes/Chapter 7 Lecture.pptx
+++ b/Fall2018 Lecture Notes/Chapter 7 Lecture.pptx
@@ -5,7 +5,7 @@
     <p:sldMasterId id="2147483675" r:id="rId1"/>
   </p:sldMasterIdLst>
   <p:notesMasterIdLst>
-    <p:notesMasterId r:id="rId34"/>
+    <p:notesMasterId r:id="rId35"/>
   </p:notesMasterIdLst>
   <p:sldIdLst>
     <p:sldId id="256" r:id="rId2"/>
@@ -39,7 +39,8 @@
     <p:sldId id="317" r:id="rId30"/>
     <p:sldId id="318" r:id="rId31"/>
     <p:sldId id="319" r:id="rId32"/>
-    <p:sldId id="282" r:id="rId33"/>
+    <p:sldId id="320" r:id="rId33"/>
+    <p:sldId id="282" r:id="rId34"/>
   </p:sldIdLst>
   <p:sldSz cx="9144000" cy="6858000" type="screen4x3"/>
   <p:notesSz cx="6858000" cy="9144000"/>
@@ -161,8 +162,8 @@
 <pc:chgInfo xmlns:a="http://schemas.openxmlformats.org/drawingml/2006/main" xmlns:r="http://schemas.openxmlformats.org/officeDocument/2006/relationships" xmlns:ac="http://schemas.microsoft.com/office/drawing/2013/main/command" xmlns:pc="http://schemas.microsoft.com/office/powerpoint/2013/main/command">
   <pc:docChgLst>
     <pc:chgData name="Tabetha Hopke" userId="5e7e88d54752368c" providerId="LiveId" clId="{7D7435E9-9E4A-4707-8C4F-E828BB0C78FD}"/>
-    <pc:docChg chg="undo custSel modSld">
-      <pc:chgData name="Tabetha Hopke" userId="5e7e88d54752368c" providerId="LiveId" clId="{7D7435E9-9E4A-4707-8C4F-E828BB0C78FD}" dt="2018-07-24T18:11:33.784" v="144" actId="20577"/>
+    <pc:docChg chg="undo redo custSel addSld modSld">
+      <pc:chgData name="Tabetha Hopke" userId="5e7e88d54752368c" providerId="LiveId" clId="{7D7435E9-9E4A-4707-8C4F-E828BB0C78FD}" dt="2018-07-24T21:45:02.932" v="1171" actId="20577"/>
       <pc:docMkLst>
         <pc:docMk/>
       </pc:docMkLst>
@@ -188,20 +189,58 @@
           </ac:spMkLst>
         </pc:spChg>
       </pc:sldChg>
+      <pc:sldChg chg="modSp">
+        <pc:chgData name="Tabetha Hopke" userId="5e7e88d54752368c" providerId="LiveId" clId="{7D7435E9-9E4A-4707-8C4F-E828BB0C78FD}" dt="2018-07-24T19:21:12.230" v="257" actId="14"/>
+        <pc:sldMkLst>
+          <pc:docMk/>
+          <pc:sldMk cId="0" sldId="279"/>
+        </pc:sldMkLst>
+        <pc:spChg chg="mod">
+          <ac:chgData name="Tabetha Hopke" userId="5e7e88d54752368c" providerId="LiveId" clId="{7D7435E9-9E4A-4707-8C4F-E828BB0C78FD}" dt="2018-07-24T19:21:12.230" v="257" actId="14"/>
+          <ac:spMkLst>
+            <pc:docMk/>
+            <pc:sldMk cId="0" sldId="279"/>
+            <ac:spMk id="54274" creationId="{00000000-0000-0000-0000-000000000000}"/>
+          </ac:spMkLst>
+        </pc:spChg>
+      </pc:sldChg>
       <pc:sldChg chg="modSp modNotesTx">
-        <pc:chgData name="Tabetha Hopke" userId="5e7e88d54752368c" providerId="LiveId" clId="{7D7435E9-9E4A-4707-8C4F-E828BB0C78FD}" dt="2018-07-24T17:51:56.194" v="98" actId="20577"/>
+        <pc:chgData name="Tabetha Hopke" userId="5e7e88d54752368c" providerId="LiveId" clId="{7D7435E9-9E4A-4707-8C4F-E828BB0C78FD}" dt="2018-07-24T21:45:02.932" v="1171" actId="20577"/>
         <pc:sldMkLst>
           <pc:docMk/>
           <pc:sldMk cId="0" sldId="282"/>
         </pc:sldMkLst>
         <pc:spChg chg="mod">
-          <ac:chgData name="Tabetha Hopke" userId="5e7e88d54752368c" providerId="LiveId" clId="{7D7435E9-9E4A-4707-8C4F-E828BB0C78FD}" dt="2018-07-24T17:51:09.205" v="14" actId="20577"/>
+          <ac:chgData name="Tabetha Hopke" userId="5e7e88d54752368c" providerId="LiveId" clId="{7D7435E9-9E4A-4707-8C4F-E828BB0C78FD}" dt="2018-07-24T21:45:02.932" v="1171" actId="20577"/>
           <ac:spMkLst>
             <pc:docMk/>
             <pc:sldMk cId="0" sldId="282"/>
             <ac:spMk id="60418" creationId="{00000000-0000-0000-0000-000000000000}"/>
           </ac:spMkLst>
         </pc:spChg>
+      </pc:sldChg>
+      <pc:sldChg chg="addSp delSp modSp">
+        <pc:chgData name="Tabetha Hopke" userId="5e7e88d54752368c" providerId="LiveId" clId="{7D7435E9-9E4A-4707-8C4F-E828BB0C78FD}" dt="2018-07-24T20:40:02.206" v="271" actId="947"/>
+        <pc:sldMkLst>
+          <pc:docMk/>
+          <pc:sldMk cId="3551119315" sldId="295"/>
+        </pc:sldMkLst>
+        <pc:spChg chg="mod">
+          <ac:chgData name="Tabetha Hopke" userId="5e7e88d54752368c" providerId="LiveId" clId="{7D7435E9-9E4A-4707-8C4F-E828BB0C78FD}" dt="2018-07-24T20:40:02.206" v="271" actId="947"/>
+          <ac:spMkLst>
+            <pc:docMk/>
+            <pc:sldMk cId="3551119315" sldId="295"/>
+            <ac:spMk id="3" creationId="{00000000-0000-0000-0000-000000000000}"/>
+          </ac:spMkLst>
+        </pc:spChg>
+        <pc:picChg chg="add del">
+          <ac:chgData name="Tabetha Hopke" userId="5e7e88d54752368c" providerId="LiveId" clId="{7D7435E9-9E4A-4707-8C4F-E828BB0C78FD}" dt="2018-07-24T19:02:37.813" v="146" actId="20577"/>
+          <ac:picMkLst>
+            <pc:docMk/>
+            <pc:sldMk cId="3551119315" sldId="295"/>
+            <ac:picMk id="4" creationId="{00000000-0000-0000-0000-000000000000}"/>
+          </ac:picMkLst>
+        </pc:picChg>
       </pc:sldChg>
       <pc:sldChg chg="modSp">
         <pc:chgData name="Tabetha Hopke" userId="5e7e88d54752368c" providerId="LiveId" clId="{7D7435E9-9E4A-4707-8C4F-E828BB0C78FD}" dt="2018-07-24T18:11:33.784" v="144" actId="20577"/>
@@ -218,6 +257,29 @@
           </ac:spMkLst>
         </pc:spChg>
       </pc:sldChg>
+      <pc:sldChg chg="addSp modSp">
+        <pc:chgData name="Tabetha Hopke" userId="5e7e88d54752368c" providerId="LiveId" clId="{7D7435E9-9E4A-4707-8C4F-E828BB0C78FD}" dt="2018-07-24T20:39:04.659" v="265" actId="114"/>
+        <pc:sldMkLst>
+          <pc:docMk/>
+          <pc:sldMk cId="960094290" sldId="297"/>
+        </pc:sldMkLst>
+        <pc:spChg chg="mod">
+          <ac:chgData name="Tabetha Hopke" userId="5e7e88d54752368c" providerId="LiveId" clId="{7D7435E9-9E4A-4707-8C4F-E828BB0C78FD}" dt="2018-07-24T20:39:04.659" v="265" actId="114"/>
+          <ac:spMkLst>
+            <pc:docMk/>
+            <pc:sldMk cId="960094290" sldId="297"/>
+            <ac:spMk id="3" creationId="{00000000-0000-0000-0000-000000000000}"/>
+          </ac:spMkLst>
+        </pc:spChg>
+        <pc:picChg chg="add mod">
+          <ac:chgData name="Tabetha Hopke" userId="5e7e88d54752368c" providerId="LiveId" clId="{7D7435E9-9E4A-4707-8C4F-E828BB0C78FD}" dt="2018-07-24T19:02:45.121" v="148" actId="1076"/>
+          <ac:picMkLst>
+            <pc:docMk/>
+            <pc:sldMk cId="960094290" sldId="297"/>
+            <ac:picMk id="4" creationId="{AF70E3EC-C8D7-431D-92AC-6B9EEBE596E0}"/>
+          </ac:picMkLst>
+        </pc:picChg>
+      </pc:sldChg>
       <pc:sldChg chg="modSp">
         <pc:chgData name="Tabetha Hopke" userId="5e7e88d54752368c" providerId="LiveId" clId="{7D7435E9-9E4A-4707-8C4F-E828BB0C78FD}" dt="2018-07-24T17:55:59.157" v="105" actId="20577"/>
         <pc:sldMkLst>
@@ -233,17 +295,55 @@
           </ac:spMkLst>
         </pc:spChg>
       </pc:sldChg>
+      <pc:sldChg chg="addSp modSp">
+        <pc:chgData name="Tabetha Hopke" userId="5e7e88d54752368c" providerId="LiveId" clId="{7D7435E9-9E4A-4707-8C4F-E828BB0C78FD}" dt="2018-07-24T20:41:05.819" v="273"/>
+        <pc:sldMkLst>
+          <pc:docMk/>
+          <pc:sldMk cId="182288563" sldId="300"/>
+        </pc:sldMkLst>
+        <pc:spChg chg="mod">
+          <ac:chgData name="Tabetha Hopke" userId="5e7e88d54752368c" providerId="LiveId" clId="{7D7435E9-9E4A-4707-8C4F-E828BB0C78FD}" dt="2018-07-24T20:40:56.178" v="272"/>
+          <ac:spMkLst>
+            <pc:docMk/>
+            <pc:sldMk cId="182288563" sldId="300"/>
+            <ac:spMk id="3" creationId="{00000000-0000-0000-0000-000000000000}"/>
+          </ac:spMkLst>
+        </pc:spChg>
+        <pc:picChg chg="add">
+          <ac:chgData name="Tabetha Hopke" userId="5e7e88d54752368c" providerId="LiveId" clId="{7D7435E9-9E4A-4707-8C4F-E828BB0C78FD}" dt="2018-07-24T20:41:05.819" v="273"/>
+          <ac:picMkLst>
+            <pc:docMk/>
+            <pc:sldMk cId="182288563" sldId="300"/>
+            <ac:picMk id="4" creationId="{48A22063-68A3-47DE-A854-F60C0A255156}"/>
+          </ac:picMkLst>
+        </pc:picChg>
+      </pc:sldChg>
       <pc:sldChg chg="modSp">
-        <pc:chgData name="Tabetha Hopke" userId="5e7e88d54752368c" providerId="LiveId" clId="{7D7435E9-9E4A-4707-8C4F-E828BB0C78FD}" dt="2018-07-24T17:54:28.171" v="102" actId="20577"/>
+        <pc:chgData name="Tabetha Hopke" userId="5e7e88d54752368c" providerId="LiveId" clId="{7D7435E9-9E4A-4707-8C4F-E828BB0C78FD}" dt="2018-07-24T20:42:15.491" v="305" actId="20577"/>
         <pc:sldMkLst>
           <pc:docMk/>
           <pc:sldMk cId="2843439638" sldId="302"/>
         </pc:sldMkLst>
         <pc:spChg chg="mod">
-          <ac:chgData name="Tabetha Hopke" userId="5e7e88d54752368c" providerId="LiveId" clId="{7D7435E9-9E4A-4707-8C4F-E828BB0C78FD}" dt="2018-07-24T17:54:28.171" v="102" actId="20577"/>
+          <ac:chgData name="Tabetha Hopke" userId="5e7e88d54752368c" providerId="LiveId" clId="{7D7435E9-9E4A-4707-8C4F-E828BB0C78FD}" dt="2018-07-24T20:42:15.491" v="305" actId="20577"/>
           <ac:spMkLst>
             <pc:docMk/>
             <pc:sldMk cId="2843439638" sldId="302"/>
+            <ac:spMk id="3" creationId="{00000000-0000-0000-0000-000000000000}"/>
+          </ac:spMkLst>
+        </pc:spChg>
+      </pc:sldChg>
+      <pc:sldChg chg="modSp">
+        <pc:chgData name="Tabetha Hopke" userId="5e7e88d54752368c" providerId="LiveId" clId="{7D7435E9-9E4A-4707-8C4F-E828BB0C78FD}" dt="2018-07-24T20:42:46.482" v="307" actId="113"/>
+        <pc:sldMkLst>
+          <pc:docMk/>
+          <pc:sldMk cId="608244395" sldId="303"/>
+        </pc:sldMkLst>
+        <pc:spChg chg="mod">
+          <ac:chgData name="Tabetha Hopke" userId="5e7e88d54752368c" providerId="LiveId" clId="{7D7435E9-9E4A-4707-8C4F-E828BB0C78FD}" dt="2018-07-24T20:42:46.482" v="307" actId="113"/>
+          <ac:spMkLst>
+            <pc:docMk/>
+            <pc:sldMk cId="608244395" sldId="303"/>
             <ac:spMk id="3" creationId="{00000000-0000-0000-0000-000000000000}"/>
           </ac:spMkLst>
         </pc:spChg>
@@ -279,13 +379,13 @@
         </pc:spChg>
       </pc:sldChg>
       <pc:sldChg chg="modSp">
-        <pc:chgData name="Tabetha Hopke" userId="5e7e88d54752368c" providerId="LiveId" clId="{7D7435E9-9E4A-4707-8C4F-E828BB0C78FD}" dt="2018-07-24T17:58:25.197" v="110" actId="113"/>
+        <pc:chgData name="Tabetha Hopke" userId="5e7e88d54752368c" providerId="LiveId" clId="{7D7435E9-9E4A-4707-8C4F-E828BB0C78FD}" dt="2018-07-24T20:43:50.639" v="308" actId="114"/>
         <pc:sldMkLst>
           <pc:docMk/>
           <pc:sldMk cId="189921964" sldId="306"/>
         </pc:sldMkLst>
         <pc:spChg chg="mod">
-          <ac:chgData name="Tabetha Hopke" userId="5e7e88d54752368c" providerId="LiveId" clId="{7D7435E9-9E4A-4707-8C4F-E828BB0C78FD}" dt="2018-07-24T17:58:25.197" v="110" actId="113"/>
+          <ac:chgData name="Tabetha Hopke" userId="5e7e88d54752368c" providerId="LiveId" clId="{7D7435E9-9E4A-4707-8C4F-E828BB0C78FD}" dt="2018-07-24T20:43:50.639" v="308" actId="114"/>
           <ac:spMkLst>
             <pc:docMk/>
             <pc:sldMk cId="189921964" sldId="306"/>
@@ -309,13 +409,13 @@
         </pc:spChg>
       </pc:sldChg>
       <pc:sldChg chg="modSp">
-        <pc:chgData name="Tabetha Hopke" userId="5e7e88d54752368c" providerId="LiveId" clId="{7D7435E9-9E4A-4707-8C4F-E828BB0C78FD}" dt="2018-07-24T17:59:30.876" v="120" actId="20577"/>
+        <pc:chgData name="Tabetha Hopke" userId="5e7e88d54752368c" providerId="LiveId" clId="{7D7435E9-9E4A-4707-8C4F-E828BB0C78FD}" dt="2018-07-24T20:47:05.828" v="312" actId="20577"/>
         <pc:sldMkLst>
           <pc:docMk/>
           <pc:sldMk cId="3765601738" sldId="309"/>
         </pc:sldMkLst>
         <pc:spChg chg="mod">
-          <ac:chgData name="Tabetha Hopke" userId="5e7e88d54752368c" providerId="LiveId" clId="{7D7435E9-9E4A-4707-8C4F-E828BB0C78FD}" dt="2018-07-24T17:59:30.876" v="120" actId="20577"/>
+          <ac:chgData name="Tabetha Hopke" userId="5e7e88d54752368c" providerId="LiveId" clId="{7D7435E9-9E4A-4707-8C4F-E828BB0C78FD}" dt="2018-07-24T20:47:05.828" v="312" actId="20577"/>
           <ac:spMkLst>
             <pc:docMk/>
             <pc:sldMk cId="3765601738" sldId="309"/>
@@ -323,14 +423,14 @@
           </ac:spMkLst>
         </pc:spChg>
       </pc:sldChg>
-      <pc:sldChg chg="modSp">
-        <pc:chgData name="Tabetha Hopke" userId="5e7e88d54752368c" providerId="LiveId" clId="{7D7435E9-9E4A-4707-8C4F-E828BB0C78FD}" dt="2018-07-24T17:58:51.369" v="115" actId="20577"/>
+      <pc:sldChg chg="modSp modNotesTx">
+        <pc:chgData name="Tabetha Hopke" userId="5e7e88d54752368c" providerId="LiveId" clId="{7D7435E9-9E4A-4707-8C4F-E828BB0C78FD}" dt="2018-07-24T21:09:22.687" v="807" actId="20577"/>
         <pc:sldMkLst>
           <pc:docMk/>
           <pc:sldMk cId="3765601738" sldId="310"/>
         </pc:sldMkLst>
         <pc:spChg chg="mod">
-          <ac:chgData name="Tabetha Hopke" userId="5e7e88d54752368c" providerId="LiveId" clId="{7D7435E9-9E4A-4707-8C4F-E828BB0C78FD}" dt="2018-07-24T17:58:51.369" v="115" actId="20577"/>
+          <ac:chgData name="Tabetha Hopke" userId="5e7e88d54752368c" providerId="LiveId" clId="{7D7435E9-9E4A-4707-8C4F-E828BB0C78FD}" dt="2018-07-24T21:09:22.687" v="807" actId="20577"/>
           <ac:spMkLst>
             <pc:docMk/>
             <pc:sldMk cId="3765601738" sldId="310"/>
@@ -338,20 +438,187 @@
           </ac:spMkLst>
         </pc:spChg>
       </pc:sldChg>
-      <pc:sldChg chg="modSp">
-        <pc:chgData name="Tabetha Hopke" userId="5e7e88d54752368c" providerId="LiveId" clId="{7D7435E9-9E4A-4707-8C4F-E828BB0C78FD}" dt="2018-07-24T17:53:03.493" v="99" actId="114"/>
+      <pc:sldChg chg="addSp delSp modSp">
+        <pc:chgData name="Tabetha Hopke" userId="5e7e88d54752368c" providerId="LiveId" clId="{7D7435E9-9E4A-4707-8C4F-E828BB0C78FD}" dt="2018-07-24T21:11:04.356" v="824" actId="20577"/>
+        <pc:sldMkLst>
+          <pc:docMk/>
+          <pc:sldMk cId="3765601738" sldId="311"/>
+        </pc:sldMkLst>
+        <pc:spChg chg="mod">
+          <ac:chgData name="Tabetha Hopke" userId="5e7e88d54752368c" providerId="LiveId" clId="{7D7435E9-9E4A-4707-8C4F-E828BB0C78FD}" dt="2018-07-24T21:11:04.356" v="824" actId="20577"/>
+          <ac:spMkLst>
+            <pc:docMk/>
+            <pc:sldMk cId="3765601738" sldId="311"/>
+            <ac:spMk id="3" creationId="{00000000-0000-0000-0000-000000000000}"/>
+          </ac:spMkLst>
+        </pc:spChg>
+        <pc:graphicFrameChg chg="add del mod modGraphic">
+          <ac:chgData name="Tabetha Hopke" userId="5e7e88d54752368c" providerId="LiveId" clId="{7D7435E9-9E4A-4707-8C4F-E828BB0C78FD}" dt="2018-07-24T20:54:16.477" v="550" actId="478"/>
+          <ac:graphicFrameMkLst>
+            <pc:docMk/>
+            <pc:sldMk cId="3765601738" sldId="311"/>
+            <ac:graphicFrameMk id="4" creationId="{6381DC91-6FB1-4BA2-A54C-EF5006CE20CD}"/>
+          </ac:graphicFrameMkLst>
+        </pc:graphicFrameChg>
+      </pc:sldChg>
+      <pc:sldChg chg="addSp delSp modSp">
+        <pc:chgData name="Tabetha Hopke" userId="5e7e88d54752368c" providerId="LiveId" clId="{7D7435E9-9E4A-4707-8C4F-E828BB0C78FD}" dt="2018-07-24T20:54:39.444" v="553" actId="478"/>
         <pc:sldMkLst>
           <pc:docMk/>
           <pc:sldMk cId="3765601738" sldId="312"/>
         </pc:sldMkLst>
         <pc:spChg chg="mod">
-          <ac:chgData name="Tabetha Hopke" userId="5e7e88d54752368c" providerId="LiveId" clId="{7D7435E9-9E4A-4707-8C4F-E828BB0C78FD}" dt="2018-07-24T17:53:03.493" v="99" actId="114"/>
+          <ac:chgData name="Tabetha Hopke" userId="5e7e88d54752368c" providerId="LiveId" clId="{7D7435E9-9E4A-4707-8C4F-E828BB0C78FD}" dt="2018-07-24T20:52:54.449" v="546"/>
           <ac:spMkLst>
             <pc:docMk/>
             <pc:sldMk cId="3765601738" sldId="312"/>
             <ac:spMk id="3" creationId="{00000000-0000-0000-0000-000000000000}"/>
           </ac:spMkLst>
         </pc:spChg>
+        <pc:graphicFrameChg chg="add del mod">
+          <ac:chgData name="Tabetha Hopke" userId="5e7e88d54752368c" providerId="LiveId" clId="{7D7435E9-9E4A-4707-8C4F-E828BB0C78FD}" dt="2018-07-24T20:54:39.444" v="553" actId="478"/>
+          <ac:graphicFrameMkLst>
+            <pc:docMk/>
+            <pc:sldMk cId="3765601738" sldId="312"/>
+            <ac:graphicFrameMk id="4" creationId="{51D2DA6D-1EA9-44BE-8BE5-6E892F70B915}"/>
+          </ac:graphicFrameMkLst>
+        </pc:graphicFrameChg>
+      </pc:sldChg>
+      <pc:sldChg chg="modSp">
+        <pc:chgData name="Tabetha Hopke" userId="5e7e88d54752368c" providerId="LiveId" clId="{7D7435E9-9E4A-4707-8C4F-E828BB0C78FD}" dt="2018-07-24T21:41:54.364" v="1092" actId="20577"/>
+        <pc:sldMkLst>
+          <pc:docMk/>
+          <pc:sldMk cId="3765601738" sldId="313"/>
+        </pc:sldMkLst>
+        <pc:spChg chg="mod">
+          <ac:chgData name="Tabetha Hopke" userId="5e7e88d54752368c" providerId="LiveId" clId="{7D7435E9-9E4A-4707-8C4F-E828BB0C78FD}" dt="2018-07-24T21:41:54.364" v="1092" actId="20577"/>
+          <ac:spMkLst>
+            <pc:docMk/>
+            <pc:sldMk cId="3765601738" sldId="313"/>
+            <ac:spMk id="3" creationId="{00000000-0000-0000-0000-000000000000}"/>
+          </ac:spMkLst>
+        </pc:spChg>
+      </pc:sldChg>
+      <pc:sldChg chg="modSp">
+        <pc:chgData name="Tabetha Hopke" userId="5e7e88d54752368c" providerId="LiveId" clId="{7D7435E9-9E4A-4707-8C4F-E828BB0C78FD}" dt="2018-07-24T21:11:32.599" v="828" actId="20577"/>
+        <pc:sldMkLst>
+          <pc:docMk/>
+          <pc:sldMk cId="797551954" sldId="314"/>
+        </pc:sldMkLst>
+        <pc:spChg chg="mod">
+          <ac:chgData name="Tabetha Hopke" userId="5e7e88d54752368c" providerId="LiveId" clId="{7D7435E9-9E4A-4707-8C4F-E828BB0C78FD}" dt="2018-07-24T21:11:32.599" v="828" actId="20577"/>
+          <ac:spMkLst>
+            <pc:docMk/>
+            <pc:sldMk cId="797551954" sldId="314"/>
+            <ac:spMk id="3" creationId="{00000000-0000-0000-0000-000000000000}"/>
+          </ac:spMkLst>
+        </pc:spChg>
+      </pc:sldChg>
+      <pc:sldChg chg="modSp">
+        <pc:chgData name="Tabetha Hopke" userId="5e7e88d54752368c" providerId="LiveId" clId="{7D7435E9-9E4A-4707-8C4F-E828BB0C78FD}" dt="2018-07-24T20:57:39.122" v="556" actId="20577"/>
+        <pc:sldMkLst>
+          <pc:docMk/>
+          <pc:sldMk cId="2859527382" sldId="315"/>
+        </pc:sldMkLst>
+        <pc:spChg chg="mod">
+          <ac:chgData name="Tabetha Hopke" userId="5e7e88d54752368c" providerId="LiveId" clId="{7D7435E9-9E4A-4707-8C4F-E828BB0C78FD}" dt="2018-07-24T20:57:39.122" v="556" actId="20577"/>
+          <ac:spMkLst>
+            <pc:docMk/>
+            <pc:sldMk cId="2859527382" sldId="315"/>
+            <ac:spMk id="3" creationId="{00000000-0000-0000-0000-000000000000}"/>
+          </ac:spMkLst>
+        </pc:spChg>
+      </pc:sldChg>
+      <pc:sldChg chg="addSp delSp modSp modNotesTx">
+        <pc:chgData name="Tabetha Hopke" userId="5e7e88d54752368c" providerId="LiveId" clId="{7D7435E9-9E4A-4707-8C4F-E828BB0C78FD}" dt="2018-07-24T21:38:22.020" v="1085" actId="20577"/>
+        <pc:sldMkLst>
+          <pc:docMk/>
+          <pc:sldMk cId="699731687" sldId="316"/>
+        </pc:sldMkLst>
+        <pc:spChg chg="mod">
+          <ac:chgData name="Tabetha Hopke" userId="5e7e88d54752368c" providerId="LiveId" clId="{7D7435E9-9E4A-4707-8C4F-E828BB0C78FD}" dt="2018-07-24T21:38:22.020" v="1085" actId="20577"/>
+          <ac:spMkLst>
+            <pc:docMk/>
+            <pc:sldMk cId="699731687" sldId="316"/>
+            <ac:spMk id="3" creationId="{00000000-0000-0000-0000-000000000000}"/>
+          </ac:spMkLst>
+        </pc:spChg>
+        <pc:graphicFrameChg chg="add del mod">
+          <ac:chgData name="Tabetha Hopke" userId="5e7e88d54752368c" providerId="LiveId" clId="{7D7435E9-9E4A-4707-8C4F-E828BB0C78FD}" dt="2018-07-24T21:38:03.288" v="1047" actId="478"/>
+          <ac:graphicFrameMkLst>
+            <pc:docMk/>
+            <pc:sldMk cId="699731687" sldId="316"/>
+            <ac:graphicFrameMk id="4" creationId="{2EBECFFA-1EF5-4AEA-AC00-6D09636F902C}"/>
+          </ac:graphicFrameMkLst>
+        </pc:graphicFrameChg>
+        <pc:picChg chg="add del">
+          <ac:chgData name="Tabetha Hopke" userId="5e7e88d54752368c" providerId="LiveId" clId="{7D7435E9-9E4A-4707-8C4F-E828BB0C78FD}" dt="2018-07-24T21:32:24.129" v="830" actId="478"/>
+          <ac:picMkLst>
+            <pc:docMk/>
+            <pc:sldMk cId="699731687" sldId="316"/>
+            <ac:picMk id="5" creationId="{21C2616A-CA95-48F7-9396-FC1DC7EB8C37}"/>
+          </ac:picMkLst>
+        </pc:picChg>
+      </pc:sldChg>
+      <pc:sldChg chg="modSp">
+        <pc:chgData name="Tabetha Hopke" userId="5e7e88d54752368c" providerId="LiveId" clId="{7D7435E9-9E4A-4707-8C4F-E828BB0C78FD}" dt="2018-07-24T20:58:10.217" v="557" actId="20577"/>
+        <pc:sldMkLst>
+          <pc:docMk/>
+          <pc:sldMk cId="1775135083" sldId="317"/>
+        </pc:sldMkLst>
+        <pc:spChg chg="mod">
+          <ac:chgData name="Tabetha Hopke" userId="5e7e88d54752368c" providerId="LiveId" clId="{7D7435E9-9E4A-4707-8C4F-E828BB0C78FD}" dt="2018-07-24T20:58:10.217" v="557" actId="20577"/>
+          <ac:spMkLst>
+            <pc:docMk/>
+            <pc:sldMk cId="1775135083" sldId="317"/>
+            <ac:spMk id="3" creationId="{00000000-0000-0000-0000-000000000000}"/>
+          </ac:spMkLst>
+        </pc:spChg>
+      </pc:sldChg>
+      <pc:sldChg chg="modSp">
+        <pc:chgData name="Tabetha Hopke" userId="5e7e88d54752368c" providerId="LiveId" clId="{7D7435E9-9E4A-4707-8C4F-E828BB0C78FD}" dt="2018-07-24T21:44:13.930" v="1148" actId="20577"/>
+        <pc:sldMkLst>
+          <pc:docMk/>
+          <pc:sldMk cId="1194397446" sldId="318"/>
+        </pc:sldMkLst>
+        <pc:spChg chg="mod">
+          <ac:chgData name="Tabetha Hopke" userId="5e7e88d54752368c" providerId="LiveId" clId="{7D7435E9-9E4A-4707-8C4F-E828BB0C78FD}" dt="2018-07-24T21:44:13.930" v="1148" actId="20577"/>
+          <ac:spMkLst>
+            <pc:docMk/>
+            <pc:sldMk cId="1194397446" sldId="318"/>
+            <ac:spMk id="3" creationId="{00000000-0000-0000-0000-000000000000}"/>
+          </ac:spMkLst>
+        </pc:spChg>
+      </pc:sldChg>
+      <pc:sldChg chg="modNotesTx">
+        <pc:chgData name="Tabetha Hopke" userId="5e7e88d54752368c" providerId="LiveId" clId="{7D7435E9-9E4A-4707-8C4F-E828BB0C78FD}" dt="2018-07-24T21:08:04.984" v="806" actId="20577"/>
+        <pc:sldMkLst>
+          <pc:docMk/>
+          <pc:sldMk cId="1069422210" sldId="319"/>
+        </pc:sldMkLst>
+      </pc:sldChg>
+      <pc:sldChg chg="addSp modSp add modNotesTx">
+        <pc:chgData name="Tabetha Hopke" userId="5e7e88d54752368c" providerId="LiveId" clId="{7D7435E9-9E4A-4707-8C4F-E828BB0C78FD}" dt="2018-07-24T21:36:25.911" v="1046" actId="1076"/>
+        <pc:sldMkLst>
+          <pc:docMk/>
+          <pc:sldMk cId="861384290" sldId="320"/>
+        </pc:sldMkLst>
+        <pc:spChg chg="mod">
+          <ac:chgData name="Tabetha Hopke" userId="5e7e88d54752368c" providerId="LiveId" clId="{7D7435E9-9E4A-4707-8C4F-E828BB0C78FD}" dt="2018-07-24T21:36:20.535" v="1045" actId="20577"/>
+          <ac:spMkLst>
+            <pc:docMk/>
+            <pc:sldMk cId="861384290" sldId="320"/>
+            <ac:spMk id="3" creationId="{00000000-0000-0000-0000-000000000000}"/>
+          </ac:spMkLst>
+        </pc:spChg>
+        <pc:graphicFrameChg chg="add mod">
+          <ac:chgData name="Tabetha Hopke" userId="5e7e88d54752368c" providerId="LiveId" clId="{7D7435E9-9E4A-4707-8C4F-E828BB0C78FD}" dt="2018-07-24T21:36:25.911" v="1046" actId="1076"/>
+          <ac:graphicFrameMkLst>
+            <pc:docMk/>
+            <pc:sldMk cId="861384290" sldId="320"/>
+            <ac:graphicFrameMk id="4" creationId="{F12503F3-CAD0-41DE-BAFC-44CA668D36B5}"/>
+          </ac:graphicFrameMkLst>
+        </pc:graphicFrameChg>
       </pc:sldChg>
     </pc:docChg>
   </pc:docChgLst>
@@ -918,6 +1185,195 @@
 </p:notes>
 </file>
 
+<file path=ppt/notesSlides/notesSlide10.xml><?xml version="1.0" encoding="utf-8"?>
+<p:notes xmlns:a="http://schemas.openxmlformats.org/drawingml/2006/main" xmlns:r="http://schemas.openxmlformats.org/officeDocument/2006/relationships" xmlns:p="http://schemas.openxmlformats.org/presentationml/2006/main">
+  <p:cSld>
+    <p:spTree>
+      <p:nvGrpSpPr>
+        <p:cNvPr id="1" name=""/>
+        <p:cNvGrpSpPr/>
+        <p:nvPr/>
+      </p:nvGrpSpPr>
+      <p:grpSpPr>
+        <a:xfrm>
+          <a:off x="0" y="0"/>
+          <a:ext cx="0" cy="0"/>
+          <a:chOff x="0" y="0"/>
+          <a:chExt cx="0" cy="0"/>
+        </a:xfrm>
+      </p:grpSpPr>
+      <p:sp>
+        <p:nvSpPr>
+          <p:cNvPr id="2" name="Slide Image Placeholder 1"/>
+          <p:cNvSpPr>
+            <a:spLocks noGrp="1" noRot="1" noChangeAspect="1"/>
+          </p:cNvSpPr>
+          <p:nvPr>
+            <p:ph type="sldImg"/>
+          </p:nvPr>
+        </p:nvSpPr>
+        <p:spPr/>
+      </p:sp>
+      <p:sp>
+        <p:nvSpPr>
+          <p:cNvPr id="3" name="Notes Placeholder 2"/>
+          <p:cNvSpPr>
+            <a:spLocks noGrp="1"/>
+          </p:cNvSpPr>
+          <p:nvPr>
+            <p:ph type="body" idx="1"/>
+          </p:nvPr>
+        </p:nvSpPr>
+        <p:spPr/>
+        <p:txBody>
+          <a:bodyPr/>
+          <a:lstStyle/>
+          <a:p>
+            <a:endParaRPr lang="en-US" dirty="0"/>
+          </a:p>
+        </p:txBody>
+      </p:sp>
+      <p:sp>
+        <p:nvSpPr>
+          <p:cNvPr id="4" name="Slide Number Placeholder 3"/>
+          <p:cNvSpPr>
+            <a:spLocks noGrp="1"/>
+          </p:cNvSpPr>
+          <p:nvPr>
+            <p:ph type="sldNum" sz="quarter" idx="10"/>
+          </p:nvPr>
+        </p:nvSpPr>
+        <p:spPr/>
+        <p:txBody>
+          <a:bodyPr/>
+          <a:lstStyle/>
+          <a:p>
+            <a:pPr>
+              <a:defRPr/>
+            </a:pPr>
+            <a:fld id="{817BE049-20F1-406F-8CE3-42BF2CD1B4EA}" type="slidenum">
+              <a:rPr lang="en-US" smtClean="0"/>
+              <a:pPr>
+                <a:defRPr/>
+              </a:pPr>
+              <a:t>32</a:t>
+            </a:fld>
+            <a:endParaRPr lang="en-US"/>
+          </a:p>
+        </p:txBody>
+      </p:sp>
+    </p:spTree>
+    <p:extLst>
+      <p:ext uri="{BB962C8B-B14F-4D97-AF65-F5344CB8AC3E}">
+        <p14:creationId xmlns:p14="http://schemas.microsoft.com/office/powerpoint/2010/main" val="3175592277"/>
+      </p:ext>
+    </p:extLst>
+  </p:cSld>
+  <p:clrMapOvr>
+    <a:masterClrMapping/>
+  </p:clrMapOvr>
+</p:notes>
+</file>
+
+<file path=ppt/notesSlides/notesSlide11.xml><?xml version="1.0" encoding="utf-8"?>
+<p:notes xmlns:a="http://schemas.openxmlformats.org/drawingml/2006/main" xmlns:r="http://schemas.openxmlformats.org/officeDocument/2006/relationships" xmlns:p="http://schemas.openxmlformats.org/presentationml/2006/main">
+  <p:cSld>
+    <p:spTree>
+      <p:nvGrpSpPr>
+        <p:cNvPr id="1" name=""/>
+        <p:cNvGrpSpPr/>
+        <p:nvPr/>
+      </p:nvGrpSpPr>
+      <p:grpSpPr>
+        <a:xfrm>
+          <a:off x="0" y="0"/>
+          <a:ext cx="0" cy="0"/>
+          <a:chOff x="0" y="0"/>
+          <a:chExt cx="0" cy="0"/>
+        </a:xfrm>
+      </p:grpSpPr>
+      <p:sp>
+        <p:nvSpPr>
+          <p:cNvPr id="61441" name="Slide Image Placeholder 1"/>
+          <p:cNvSpPr>
+            <a:spLocks noGrp="1" noRot="1" noChangeAspect="1" noTextEdit="1"/>
+          </p:cNvSpPr>
+          <p:nvPr>
+            <p:ph type="sldImg"/>
+          </p:nvPr>
+        </p:nvSpPr>
+        <p:spPr>
+          <a:ln/>
+        </p:spPr>
+      </p:sp>
+      <p:sp>
+        <p:nvSpPr>
+          <p:cNvPr id="61442" name="Notes Placeholder 2"/>
+          <p:cNvSpPr>
+            <a:spLocks noGrp="1"/>
+          </p:cNvSpPr>
+          <p:nvPr>
+            <p:ph type="body" idx="1"/>
+          </p:nvPr>
+        </p:nvSpPr>
+        <p:spPr>
+          <a:noFill/>
+          <a:ln/>
+        </p:spPr>
+        <p:txBody>
+          <a:bodyPr/>
+          <a:lstStyle/>
+          <a:p>
+            <a:endParaRPr lang="en-US" dirty="0">
+              <a:latin typeface="Lucida Grande"/>
+              <a:ea typeface="Geneva"/>
+              <a:cs typeface="Geneva"/>
+            </a:endParaRPr>
+          </a:p>
+        </p:txBody>
+      </p:sp>
+      <p:sp>
+        <p:nvSpPr>
+          <p:cNvPr id="61443" name="Slide Number Placeholder 3"/>
+          <p:cNvSpPr>
+            <a:spLocks noGrp="1"/>
+          </p:cNvSpPr>
+          <p:nvPr>
+            <p:ph type="sldNum" sz="quarter" idx="5"/>
+          </p:nvPr>
+        </p:nvSpPr>
+        <p:spPr>
+          <a:noFill/>
+        </p:spPr>
+        <p:txBody>
+          <a:bodyPr/>
+          <a:lstStyle/>
+          <a:p>
+            <a:fld id="{22D4CEE2-C57F-46BF-9380-DB5FF0AA2248}" type="slidenum">
+              <a:rPr lang="en-US" smtClean="0">
+                <a:latin typeface="Lucida Grande"/>
+                <a:ea typeface="Geneva"/>
+                <a:cs typeface="Geneva"/>
+              </a:rPr>
+              <a:pPr/>
+              <a:t>33</a:t>
+            </a:fld>
+            <a:endParaRPr lang="en-US">
+              <a:latin typeface="Lucida Grande"/>
+              <a:ea typeface="Geneva"/>
+              <a:cs typeface="Geneva"/>
+            </a:endParaRPr>
+          </a:p>
+        </p:txBody>
+      </p:sp>
+    </p:spTree>
+  </p:cSld>
+  <p:clrMapOvr>
+    <a:masterClrMapping/>
+  </p:clrMapOvr>
+</p:notes>
+</file>
+
 <file path=ppt/notesSlides/notesSlide2.xml><?xml version="1.0" encoding="utf-8"?>
 <p:notes xmlns:a="http://schemas.openxmlformats.org/drawingml/2006/main" xmlns:r="http://schemas.openxmlformats.org/officeDocument/2006/relationships" xmlns:p="http://schemas.openxmlformats.org/presentationml/2006/main">
   <p:cSld>
@@ -1039,80 +1495,70 @@
       </p:grpSpPr>
       <p:sp>
         <p:nvSpPr>
-          <p:cNvPr id="47105" name="Rectangle 7"/>
-          <p:cNvSpPr>
-            <a:spLocks noGrp="1" noChangeArrowheads="1"/>
-          </p:cNvSpPr>
-          <p:nvPr>
-            <p:ph type="sldNum" sz="quarter" idx="5"/>
-          </p:nvPr>
-        </p:nvSpPr>
-        <p:spPr>
-          <a:noFill/>
-        </p:spPr>
-        <p:txBody>
-          <a:bodyPr/>
-          <a:lstStyle/>
-          <a:p>
-            <a:fld id="{9D85058A-C243-415B-91BB-20913EB48F1B}" type="slidenum">
-              <a:rPr lang="en-US" smtClean="0">
-                <a:latin typeface="Lucida Grande"/>
-                <a:ea typeface="Geneva"/>
-                <a:cs typeface="Geneva"/>
-              </a:rPr>
-              <a:pPr/>
-              <a:t>12</a:t>
+          <p:cNvPr id="2" name="Slide Image Placeholder 1"/>
+          <p:cNvSpPr>
+            <a:spLocks noGrp="1" noRot="1" noChangeAspect="1"/>
+          </p:cNvSpPr>
+          <p:nvPr>
+            <p:ph type="sldImg"/>
+          </p:nvPr>
+        </p:nvSpPr>
+        <p:spPr/>
+      </p:sp>
+      <p:sp>
+        <p:nvSpPr>
+          <p:cNvPr id="3" name="Notes Placeholder 2"/>
+          <p:cNvSpPr>
+            <a:spLocks noGrp="1"/>
+          </p:cNvSpPr>
+          <p:nvPr>
+            <p:ph type="body" idx="1"/>
+          </p:nvPr>
+        </p:nvSpPr>
+        <p:spPr/>
+        <p:txBody>
+          <a:bodyPr/>
+          <a:lstStyle/>
+          <a:p>
+            <a:endParaRPr lang="en-US" dirty="0"/>
+          </a:p>
+        </p:txBody>
+      </p:sp>
+      <p:sp>
+        <p:nvSpPr>
+          <p:cNvPr id="4" name="Slide Number Placeholder 3"/>
+          <p:cNvSpPr>
+            <a:spLocks noGrp="1"/>
+          </p:cNvSpPr>
+          <p:nvPr>
+            <p:ph type="sldNum" sz="quarter" idx="10"/>
+          </p:nvPr>
+        </p:nvSpPr>
+        <p:spPr/>
+        <p:txBody>
+          <a:bodyPr/>
+          <a:lstStyle/>
+          <a:p>
+            <a:pPr>
+              <a:defRPr/>
+            </a:pPr>
+            <a:fld id="{817BE049-20F1-406F-8CE3-42BF2CD1B4EA}" type="slidenum">
+              <a:rPr lang="en-US" smtClean="0"/>
+              <a:pPr>
+                <a:defRPr/>
+              </a:pPr>
+              <a:t>5</a:t>
             </a:fld>
-            <a:endParaRPr lang="en-US">
-              <a:latin typeface="Lucida Grande"/>
-              <a:ea typeface="Geneva"/>
-              <a:cs typeface="Geneva"/>
-            </a:endParaRPr>
-          </a:p>
-        </p:txBody>
-      </p:sp>
-      <p:sp>
-        <p:nvSpPr>
-          <p:cNvPr id="47106" name="Rectangle 2"/>
-          <p:cNvSpPr>
-            <a:spLocks noGrp="1" noRot="1" noChangeAspect="1" noChangeArrowheads="1" noTextEdit="1"/>
-          </p:cNvSpPr>
-          <p:nvPr>
-            <p:ph type="sldImg"/>
-          </p:nvPr>
-        </p:nvSpPr>
-        <p:spPr>
-          <a:ln/>
-        </p:spPr>
-      </p:sp>
-      <p:sp>
-        <p:nvSpPr>
-          <p:cNvPr id="47107" name="Rectangle 3"/>
-          <p:cNvSpPr>
-            <a:spLocks noGrp="1" noChangeArrowheads="1"/>
-          </p:cNvSpPr>
-          <p:nvPr>
-            <p:ph type="body" idx="1"/>
-          </p:nvPr>
-        </p:nvSpPr>
-        <p:spPr>
-          <a:noFill/>
-          <a:ln/>
-        </p:spPr>
-        <p:txBody>
-          <a:bodyPr/>
-          <a:lstStyle/>
-          <a:p>
-            <a:pPr eaLnBrk="1" hangingPunct="1"/>
-            <a:endParaRPr lang="en-US">
-              <a:latin typeface="Lucida Grande"/>
-              <a:ea typeface="Geneva"/>
-              <a:cs typeface="Geneva"/>
-            </a:endParaRPr>
+            <a:endParaRPr lang="en-US"/>
           </a:p>
         </p:txBody>
       </p:sp>
     </p:spTree>
+    <p:extLst>
+      <p:ext uri="{BB962C8B-B14F-4D97-AF65-F5344CB8AC3E}">
+        <p14:creationId xmlns:p14="http://schemas.microsoft.com/office/powerpoint/2010/main" val="2038520156"/>
+      </p:ext>
+    </p:extLst>
   </p:cSld>
   <p:clrMapOvr>
     <a:masterClrMapping/>
@@ -1139,49 +1585,9 @@
       </p:grpSpPr>
       <p:sp>
         <p:nvSpPr>
-          <p:cNvPr id="49153" name="Slide Image Placeholder 1"/>
-          <p:cNvSpPr>
-            <a:spLocks noGrp="1" noRot="1" noChangeAspect="1" noTextEdit="1"/>
-          </p:cNvSpPr>
-          <p:nvPr>
-            <p:ph type="sldImg"/>
-          </p:nvPr>
-        </p:nvSpPr>
-        <p:spPr>
-          <a:ln/>
-        </p:spPr>
-      </p:sp>
-      <p:sp>
-        <p:nvSpPr>
-          <p:cNvPr id="49154" name="Notes Placeholder 2"/>
-          <p:cNvSpPr>
-            <a:spLocks noGrp="1"/>
-          </p:cNvSpPr>
-          <p:nvPr>
-            <p:ph type="body" idx="1"/>
-          </p:nvPr>
-        </p:nvSpPr>
-        <p:spPr>
-          <a:noFill/>
-          <a:ln/>
-        </p:spPr>
-        <p:txBody>
-          <a:bodyPr/>
-          <a:lstStyle/>
-          <a:p>
-            <a:endParaRPr lang="en-US">
-              <a:latin typeface="Lucida Grande"/>
-              <a:ea typeface="Geneva"/>
-              <a:cs typeface="Geneva"/>
-            </a:endParaRPr>
-          </a:p>
-        </p:txBody>
-      </p:sp>
-      <p:sp>
-        <p:nvSpPr>
-          <p:cNvPr id="49155" name="Slide Number Placeholder 3"/>
-          <p:cNvSpPr>
-            <a:spLocks noGrp="1"/>
+          <p:cNvPr id="47105" name="Rectangle 7"/>
+          <p:cNvSpPr>
+            <a:spLocks noGrp="1" noChangeArrowheads="1"/>
           </p:cNvSpPr>
           <p:nvPr>
             <p:ph type="sldNum" sz="quarter" idx="5"/>
@@ -1194,15 +1600,56 @@
           <a:bodyPr/>
           <a:lstStyle/>
           <a:p>
-            <a:fld id="{E466AD20-99A6-4A4D-BDF5-317BDAD75090}" type="slidenum">
+            <a:fld id="{9D85058A-C243-415B-91BB-20913EB48F1B}" type="slidenum">
               <a:rPr lang="en-US" smtClean="0">
                 <a:latin typeface="Lucida Grande"/>
                 <a:ea typeface="Geneva"/>
                 <a:cs typeface="Geneva"/>
               </a:rPr>
               <a:pPr/>
-              <a:t>13</a:t>
+              <a:t>12</a:t>
             </a:fld>
+            <a:endParaRPr lang="en-US">
+              <a:latin typeface="Lucida Grande"/>
+              <a:ea typeface="Geneva"/>
+              <a:cs typeface="Geneva"/>
+            </a:endParaRPr>
+          </a:p>
+        </p:txBody>
+      </p:sp>
+      <p:sp>
+        <p:nvSpPr>
+          <p:cNvPr id="47106" name="Rectangle 2"/>
+          <p:cNvSpPr>
+            <a:spLocks noGrp="1" noRot="1" noChangeAspect="1" noChangeArrowheads="1" noTextEdit="1"/>
+          </p:cNvSpPr>
+          <p:nvPr>
+            <p:ph type="sldImg"/>
+          </p:nvPr>
+        </p:nvSpPr>
+        <p:spPr>
+          <a:ln/>
+        </p:spPr>
+      </p:sp>
+      <p:sp>
+        <p:nvSpPr>
+          <p:cNvPr id="47107" name="Rectangle 3"/>
+          <p:cNvSpPr>
+            <a:spLocks noGrp="1" noChangeArrowheads="1"/>
+          </p:cNvSpPr>
+          <p:nvPr>
+            <p:ph type="body" idx="1"/>
+          </p:nvPr>
+        </p:nvSpPr>
+        <p:spPr>
+          <a:noFill/>
+          <a:ln/>
+        </p:spPr>
+        <p:txBody>
+          <a:bodyPr/>
+          <a:lstStyle/>
+          <a:p>
+            <a:pPr eaLnBrk="1" hangingPunct="1"/>
             <a:endParaRPr lang="en-US">
               <a:latin typeface="Lucida Grande"/>
               <a:ea typeface="Geneva"/>
@@ -1238,19 +1685,21 @@
       </p:grpSpPr>
       <p:sp>
         <p:nvSpPr>
-          <p:cNvPr id="2" name="Slide Image Placeholder 1"/>
-          <p:cNvSpPr>
-            <a:spLocks noGrp="1" noRot="1" noChangeAspect="1"/>
+          <p:cNvPr id="49153" name="Slide Image Placeholder 1"/>
+          <p:cNvSpPr>
+            <a:spLocks noGrp="1" noRot="1" noChangeAspect="1" noTextEdit="1"/>
           </p:cNvSpPr>
           <p:nvPr>
             <p:ph type="sldImg"/>
           </p:nvPr>
         </p:nvSpPr>
-        <p:spPr/>
-      </p:sp>
-      <p:sp>
-        <p:nvSpPr>
-          <p:cNvPr id="3" name="Notes Placeholder 2"/>
+        <p:spPr>
+          <a:ln/>
+        </p:spPr>
+      </p:sp>
+      <p:sp>
+        <p:nvSpPr>
+          <p:cNvPr id="49154" name="Notes Placeholder 2"/>
           <p:cNvSpPr>
             <a:spLocks noGrp="1"/>
           </p:cNvSpPr>
@@ -1258,50 +1707,57 @@
             <p:ph type="body" idx="1"/>
           </p:nvPr>
         </p:nvSpPr>
-        <p:spPr/>
-        <p:txBody>
-          <a:bodyPr/>
-          <a:lstStyle/>
-          <a:p>
-            <a:endParaRPr lang="en-US" dirty="0"/>
-          </a:p>
-        </p:txBody>
-      </p:sp>
-      <p:sp>
-        <p:nvSpPr>
-          <p:cNvPr id="4" name="Slide Number Placeholder 3"/>
-          <p:cNvSpPr>
-            <a:spLocks noGrp="1"/>
-          </p:cNvSpPr>
-          <p:nvPr>
-            <p:ph type="sldNum" sz="quarter" idx="10"/>
-          </p:nvPr>
-        </p:nvSpPr>
-        <p:spPr/>
-        <p:txBody>
-          <a:bodyPr/>
-          <a:lstStyle/>
-          <a:p>
-            <a:pPr>
-              <a:defRPr/>
-            </a:pPr>
-            <a:fld id="{817BE049-20F1-406F-8CE3-42BF2CD1B4EA}" type="slidenum">
-              <a:rPr lang="en-US" smtClean="0"/>
-              <a:pPr>
-                <a:defRPr/>
-              </a:pPr>
-              <a:t>21</a:t>
+        <p:spPr>
+          <a:noFill/>
+          <a:ln/>
+        </p:spPr>
+        <p:txBody>
+          <a:bodyPr/>
+          <a:lstStyle/>
+          <a:p>
+            <a:endParaRPr lang="en-US">
+              <a:latin typeface="Lucida Grande"/>
+              <a:ea typeface="Geneva"/>
+              <a:cs typeface="Geneva"/>
+            </a:endParaRPr>
+          </a:p>
+        </p:txBody>
+      </p:sp>
+      <p:sp>
+        <p:nvSpPr>
+          <p:cNvPr id="49155" name="Slide Number Placeholder 3"/>
+          <p:cNvSpPr>
+            <a:spLocks noGrp="1"/>
+          </p:cNvSpPr>
+          <p:nvPr>
+            <p:ph type="sldNum" sz="quarter" idx="5"/>
+          </p:nvPr>
+        </p:nvSpPr>
+        <p:spPr>
+          <a:noFill/>
+        </p:spPr>
+        <p:txBody>
+          <a:bodyPr/>
+          <a:lstStyle/>
+          <a:p>
+            <a:fld id="{E466AD20-99A6-4A4D-BDF5-317BDAD75090}" type="slidenum">
+              <a:rPr lang="en-US" smtClean="0">
+                <a:latin typeface="Lucida Grande"/>
+                <a:ea typeface="Geneva"/>
+                <a:cs typeface="Geneva"/>
+              </a:rPr>
+              <a:pPr/>
+              <a:t>13</a:t>
             </a:fld>
-            <a:endParaRPr lang="en-US"/>
+            <a:endParaRPr lang="en-US">
+              <a:latin typeface="Lucida Grande"/>
+              <a:ea typeface="Geneva"/>
+              <a:cs typeface="Geneva"/>
+            </a:endParaRPr>
           </a:p>
         </p:txBody>
       </p:sp>
     </p:spTree>
-    <p:extLst>
-      <p:ext uri="{BB962C8B-B14F-4D97-AF65-F5344CB8AC3E}">
-        <p14:creationId xmlns:p14="http://schemas.microsoft.com/office/powerpoint/2010/main" val="2176205565"/>
-      </p:ext>
-    </p:extLst>
   </p:cSld>
   <p:clrMapOvr>
     <a:masterClrMapping/>
@@ -1354,12 +1810,8 @@
           <a:lstStyle/>
           <a:p>
             <a:r>
-              <a:rPr lang="en-US" dirty="0" err="1"/>
-              <a:t>Pnorm</a:t>
-            </a:r>
-            <a:r>
-              <a:rPr lang="en-US" dirty="0"/>
-              <a:t> was here for </a:t>
+              <a:rPr lang="en-US" dirty="0"/>
+              <a:t>Mean, standard deviation, etc. </a:t>
             </a:r>
           </a:p>
         </p:txBody>
@@ -1387,7 +1839,7 @@
               <a:pPr>
                 <a:defRPr/>
               </a:pPr>
-              <a:t>24</a:t>
+              <a:t>21</a:t>
             </a:fld>
             <a:endParaRPr lang="en-US"/>
           </a:p>
@@ -1396,7 +1848,7 @@
     </p:spTree>
     <p:extLst>
       <p:ext uri="{BB962C8B-B14F-4D97-AF65-F5344CB8AC3E}">
-        <p14:creationId xmlns:p14="http://schemas.microsoft.com/office/powerpoint/2010/main" val="1521231553"/>
+        <p14:creationId xmlns:p14="http://schemas.microsoft.com/office/powerpoint/2010/main" val="2176205565"/>
       </p:ext>
     </p:extLst>
   </p:cSld>
@@ -1425,21 +1877,19 @@
       </p:grpSpPr>
       <p:sp>
         <p:nvSpPr>
-          <p:cNvPr id="55297" name="Slide Image Placeholder 1"/>
-          <p:cNvSpPr>
-            <a:spLocks noGrp="1" noRot="1" noChangeAspect="1" noTextEdit="1"/>
+          <p:cNvPr id="2" name="Slide Image Placeholder 1"/>
+          <p:cNvSpPr>
+            <a:spLocks noGrp="1" noRot="1" noChangeAspect="1"/>
           </p:cNvSpPr>
           <p:nvPr>
             <p:ph type="sldImg"/>
           </p:nvPr>
         </p:nvSpPr>
-        <p:spPr>
-          <a:ln/>
-        </p:spPr>
-      </p:sp>
-      <p:sp>
-        <p:nvSpPr>
-          <p:cNvPr id="55298" name="Notes Placeholder 2"/>
+        <p:spPr/>
+      </p:sp>
+      <p:sp>
+        <p:nvSpPr>
+          <p:cNvPr id="3" name="Notes Placeholder 2"/>
           <p:cNvSpPr>
             <a:spLocks noGrp="1"/>
           </p:cNvSpPr>
@@ -1447,57 +1897,53 @@
             <p:ph type="body" idx="1"/>
           </p:nvPr>
         </p:nvSpPr>
-        <p:spPr>
-          <a:noFill/>
-          <a:ln/>
-        </p:spPr>
-        <p:txBody>
-          <a:bodyPr/>
-          <a:lstStyle/>
-          <a:p>
-            <a:endParaRPr lang="en-US">
-              <a:latin typeface="Lucida Grande"/>
-              <a:ea typeface="Geneva"/>
-              <a:cs typeface="Geneva"/>
-            </a:endParaRPr>
-          </a:p>
-        </p:txBody>
-      </p:sp>
-      <p:sp>
-        <p:nvSpPr>
-          <p:cNvPr id="55299" name="Slide Number Placeholder 3"/>
-          <p:cNvSpPr>
-            <a:spLocks noGrp="1"/>
-          </p:cNvSpPr>
-          <p:nvPr>
-            <p:ph type="sldNum" sz="quarter" idx="5"/>
-          </p:nvPr>
-        </p:nvSpPr>
-        <p:spPr>
-          <a:noFill/>
-        </p:spPr>
-        <p:txBody>
-          <a:bodyPr/>
-          <a:lstStyle/>
-          <a:p>
-            <a:fld id="{4BC8563E-B840-4E37-AE95-4550FECA91B8}" type="slidenum">
-              <a:rPr lang="en-US" smtClean="0">
-                <a:latin typeface="Lucida Grande"/>
-                <a:ea typeface="Geneva"/>
-                <a:cs typeface="Geneva"/>
-              </a:rPr>
-              <a:pPr/>
-              <a:t>28</a:t>
+        <p:spPr/>
+        <p:txBody>
+          <a:bodyPr/>
+          <a:lstStyle/>
+          <a:p>
+            <a:r>
+              <a:rPr lang="en-US" dirty="0"/>
+              <a:t>Ta</a:t>
+            </a:r>
+          </a:p>
+        </p:txBody>
+      </p:sp>
+      <p:sp>
+        <p:nvSpPr>
+          <p:cNvPr id="4" name="Slide Number Placeholder 3"/>
+          <p:cNvSpPr>
+            <a:spLocks noGrp="1"/>
+          </p:cNvSpPr>
+          <p:nvPr>
+            <p:ph type="sldNum" sz="quarter" idx="10"/>
+          </p:nvPr>
+        </p:nvSpPr>
+        <p:spPr/>
+        <p:txBody>
+          <a:bodyPr/>
+          <a:lstStyle/>
+          <a:p>
+            <a:pPr>
+              <a:defRPr/>
+            </a:pPr>
+            <a:fld id="{817BE049-20F1-406F-8CE3-42BF2CD1B4EA}" type="slidenum">
+              <a:rPr lang="en-US" smtClean="0"/>
+              <a:pPr>
+                <a:defRPr/>
+              </a:pPr>
+              <a:t>24</a:t>
             </a:fld>
-            <a:endParaRPr lang="en-US">
-              <a:latin typeface="Lucida Grande"/>
-              <a:ea typeface="Geneva"/>
-              <a:cs typeface="Geneva"/>
-            </a:endParaRPr>
+            <a:endParaRPr lang="en-US"/>
           </a:p>
         </p:txBody>
       </p:sp>
     </p:spTree>
+    <p:extLst>
+      <p:ext uri="{BB962C8B-B14F-4D97-AF65-F5344CB8AC3E}">
+        <p14:creationId xmlns:p14="http://schemas.microsoft.com/office/powerpoint/2010/main" val="1521231553"/>
+      </p:ext>
+    </p:extLst>
   </p:cSld>
   <p:clrMapOvr>
     <a:masterClrMapping/>
@@ -1524,7 +1970,7 @@
       </p:grpSpPr>
       <p:sp>
         <p:nvSpPr>
-          <p:cNvPr id="61441" name="Slide Image Placeholder 1"/>
+          <p:cNvPr id="55297" name="Slide Image Placeholder 1"/>
           <p:cNvSpPr>
             <a:spLocks noGrp="1" noRot="1" noChangeAspect="1" noTextEdit="1"/>
           </p:cNvSpPr>
@@ -1538,7 +1984,7 @@
       </p:sp>
       <p:sp>
         <p:nvSpPr>
-          <p:cNvPr id="61442" name="Notes Placeholder 2"/>
+          <p:cNvPr id="55298" name="Notes Placeholder 2"/>
           <p:cNvSpPr>
             <a:spLocks noGrp="1"/>
           </p:cNvSpPr>
@@ -1554,20 +2000,17 @@
           <a:bodyPr/>
           <a:lstStyle/>
           <a:p>
-            <a:r>
-              <a:rPr lang="en-US" dirty="0">
-                <a:latin typeface="Lucida Grande"/>
-                <a:ea typeface="Geneva"/>
-                <a:cs typeface="Geneva"/>
-              </a:rPr>
-              <a:t>Assumption that they would guess lower than actual calories for organic meals </a:t>
-            </a:r>
-          </a:p>
-        </p:txBody>
-      </p:sp>
-      <p:sp>
-        <p:nvSpPr>
-          <p:cNvPr id="61443" name="Slide Number Placeholder 3"/>
+            <a:endParaRPr lang="en-US">
+              <a:latin typeface="Lucida Grande"/>
+              <a:ea typeface="Geneva"/>
+              <a:cs typeface="Geneva"/>
+            </a:endParaRPr>
+          </a:p>
+        </p:txBody>
+      </p:sp>
+      <p:sp>
+        <p:nvSpPr>
+          <p:cNvPr id="55299" name="Slide Number Placeholder 3"/>
           <p:cNvSpPr>
             <a:spLocks noGrp="1"/>
           </p:cNvSpPr>
@@ -1582,14 +2025,14 @@
           <a:bodyPr/>
           <a:lstStyle/>
           <a:p>
-            <a:fld id="{22D4CEE2-C57F-46BF-9380-DB5FF0AA2248}" type="slidenum">
+            <a:fld id="{4BC8563E-B840-4E37-AE95-4550FECA91B8}" type="slidenum">
               <a:rPr lang="en-US" smtClean="0">
                 <a:latin typeface="Lucida Grande"/>
                 <a:ea typeface="Geneva"/>
                 <a:cs typeface="Geneva"/>
               </a:rPr>
               <a:pPr/>
-              <a:t>32</a:t>
+              <a:t>28</a:t>
             </a:fld>
             <a:endParaRPr lang="en-US">
               <a:latin typeface="Lucida Grande"/>
@@ -1600,6 +2043,99 @@
         </p:txBody>
       </p:sp>
     </p:spTree>
+  </p:cSld>
+  <p:clrMapOvr>
+    <a:masterClrMapping/>
+  </p:clrMapOvr>
+</p:notes>
+</file>
+
+<file path=ppt/notesSlides/notesSlide9.xml><?xml version="1.0" encoding="utf-8"?>
+<p:notes xmlns:a="http://schemas.openxmlformats.org/drawingml/2006/main" xmlns:r="http://schemas.openxmlformats.org/officeDocument/2006/relationships" xmlns:p="http://schemas.openxmlformats.org/presentationml/2006/main">
+  <p:cSld>
+    <p:spTree>
+      <p:nvGrpSpPr>
+        <p:cNvPr id="1" name=""/>
+        <p:cNvGrpSpPr/>
+        <p:nvPr/>
+      </p:nvGrpSpPr>
+      <p:grpSpPr>
+        <a:xfrm>
+          <a:off x="0" y="0"/>
+          <a:ext cx="0" cy="0"/>
+          <a:chOff x="0" y="0"/>
+          <a:chExt cx="0" cy="0"/>
+        </a:xfrm>
+      </p:grpSpPr>
+      <p:sp>
+        <p:nvSpPr>
+          <p:cNvPr id="2" name="Slide Image Placeholder 1"/>
+          <p:cNvSpPr>
+            <a:spLocks noGrp="1" noRot="1" noChangeAspect="1"/>
+          </p:cNvSpPr>
+          <p:nvPr>
+            <p:ph type="sldImg"/>
+          </p:nvPr>
+        </p:nvSpPr>
+        <p:spPr/>
+      </p:sp>
+      <p:sp>
+        <p:nvSpPr>
+          <p:cNvPr id="3" name="Notes Placeholder 2"/>
+          <p:cNvSpPr>
+            <a:spLocks noGrp="1"/>
+          </p:cNvSpPr>
+          <p:nvPr>
+            <p:ph type="body" idx="1"/>
+          </p:nvPr>
+        </p:nvSpPr>
+        <p:spPr/>
+        <p:txBody>
+          <a:bodyPr/>
+          <a:lstStyle/>
+          <a:p>
+            <a:r>
+              <a:rPr lang="en-US" dirty="0"/>
+              <a:t>**this is what is usually used in journal articles</a:t>
+            </a:r>
+          </a:p>
+        </p:txBody>
+      </p:sp>
+      <p:sp>
+        <p:nvSpPr>
+          <p:cNvPr id="4" name="Slide Number Placeholder 3"/>
+          <p:cNvSpPr>
+            <a:spLocks noGrp="1"/>
+          </p:cNvSpPr>
+          <p:nvPr>
+            <p:ph type="sldNum" sz="quarter" idx="10"/>
+          </p:nvPr>
+        </p:nvSpPr>
+        <p:spPr/>
+        <p:txBody>
+          <a:bodyPr/>
+          <a:lstStyle/>
+          <a:p>
+            <a:pPr>
+              <a:defRPr/>
+            </a:pPr>
+            <a:fld id="{817BE049-20F1-406F-8CE3-42BF2CD1B4EA}" type="slidenum">
+              <a:rPr lang="en-US" smtClean="0"/>
+              <a:pPr>
+                <a:defRPr/>
+              </a:pPr>
+              <a:t>31</a:t>
+            </a:fld>
+            <a:endParaRPr lang="en-US"/>
+          </a:p>
+        </p:txBody>
+      </p:sp>
+    </p:spTree>
+    <p:extLst>
+      <p:ext uri="{BB962C8B-B14F-4D97-AF65-F5344CB8AC3E}">
+        <p14:creationId xmlns:p14="http://schemas.microsoft.com/office/powerpoint/2010/main" val="1808447448"/>
+      </p:ext>
+    </p:extLst>
   </p:cSld>
   <p:clrMapOvr>
     <a:masterClrMapping/>
@@ -5663,25 +6199,33 @@
             <a:pPr lvl="1"/>
             <a:r>
               <a:rPr lang="en-US" dirty="0"/>
-              <a:t>Distributions (how to compare scores, z distribution)</a:t>
+              <a:t>Distributions (how to compare scores, </a:t>
+            </a:r>
+            <a:r>
+              <a:rPr lang="en-US" i="1" dirty="0"/>
+              <a:t>z</a:t>
+            </a:r>
+            <a:r>
+              <a:rPr lang="en-US" dirty="0"/>
+              <a:t> distribution)</a:t>
             </a:r>
           </a:p>
           <a:p>
             <a:pPr lvl="1"/>
             <a:r>
               <a:rPr lang="en-US" i="1" dirty="0"/>
-              <a:t>p</a:t>
-            </a:r>
-            <a:r>
-              <a:rPr lang="en-US" dirty="0"/>
-              <a:t>-values (percentages)</a:t>
+              <a:t>p </a:t>
+            </a:r>
+            <a:r>
+              <a:rPr lang="en-US" dirty="0"/>
+              <a:t>values (percentages)</a:t>
             </a:r>
           </a:p>
           <a:p>
             <a:pPr lvl="1"/>
             <a:r>
               <a:rPr lang="en-US" dirty="0"/>
-              <a:t>Decisions (reject, fail to reject null)</a:t>
+              <a:t>Decisions (reject or fail to reject the null hypothesis)</a:t>
             </a:r>
           </a:p>
           <a:p>
@@ -6230,7 +6774,15 @@
             <a:pPr lvl="1"/>
             <a:r>
               <a:rPr lang="en-US" dirty="0"/>
-              <a:t>Yes, with the magic number N = 30</a:t>
+              <a:t>Yes, with the magic number </a:t>
+            </a:r>
+            <a:r>
+              <a:rPr lang="en-US" i="1" dirty="0"/>
+              <a:t>N</a:t>
+            </a:r>
+            <a:r>
+              <a:rPr lang="en-US" dirty="0"/>
+              <a:t> = 30</a:t>
             </a:r>
           </a:p>
         </p:txBody>
@@ -6601,7 +7153,7 @@
             <a:pPr lvl="2"/>
             <a:r>
               <a:rPr lang="en-US" dirty="0"/>
-              <a:t>Research: sample /= population</a:t>
+              <a:t>Research: sample ≠ population</a:t>
             </a:r>
           </a:p>
           <a:p>
@@ -6690,7 +7242,7 @@
             <a:pPr lvl="1"/>
             <a:r>
               <a:rPr lang="en-US" dirty="0"/>
-              <a:t>What?  Write down the numbers/symbols that describe step 1 and 2</a:t>
+              <a:t>What?  Write down the numbers/symbols that describe steps 1 and 2</a:t>
             </a:r>
           </a:p>
         </p:txBody>
@@ -6771,15 +7323,23 @@
           <a:p>
             <a:pPr lvl="1"/>
             <a:r>
-              <a:rPr lang="en-US" dirty="0"/>
-              <a:t>Cut off scores: (aka critical values) scores beyond which we would reject the null hypothesis</a:t>
+              <a:rPr lang="en-US" b="1" dirty="0"/>
+              <a:t>Cutoff scores: </a:t>
+            </a:r>
+            <a:r>
+              <a:rPr lang="en-US" dirty="0"/>
+              <a:t>(aka critical values) scores beyond which we would reject the null hypothesis</a:t>
             </a:r>
           </a:p>
           <a:p>
             <a:pPr lvl="1"/>
             <a:r>
-              <a:rPr lang="en-US" dirty="0"/>
-              <a:t>Critical region: area of the distribution (tails) where we would reject the null hypothesis</a:t>
+              <a:rPr lang="en-US" b="1" dirty="0"/>
+              <a:t>Critical region: </a:t>
+            </a:r>
+            <a:r>
+              <a:rPr lang="en-US" dirty="0"/>
+              <a:t>area of the distribution (tails) where we would reject the null hypothesis</a:t>
             </a:r>
           </a:p>
         </p:txBody>
@@ -6885,11 +7445,19 @@
             </a:r>
             <a:r>
               <a:rPr lang="en-US" i="1" dirty="0"/>
-              <a:t>p</a:t>
-            </a:r>
-            <a:r>
-              <a:rPr lang="en-US" dirty="0"/>
-              <a:t>–level (or </a:t>
+              <a:t>p-</a:t>
+            </a:r>
+            <a:r>
+              <a:rPr lang="en-US" dirty="0"/>
+              <a:t>level (or </a:t>
+            </a:r>
+            <a:r>
+              <a:rPr lang="en-US" i="1" dirty="0"/>
+              <a:t>p-</a:t>
+            </a:r>
+            <a:r>
+              <a:rPr lang="en-US" dirty="0"/>
+              <a:t>critical)…I find this confusing with the actual </a:t>
             </a:r>
             <a:r>
               <a:rPr lang="en-US" i="1" dirty="0"/>
@@ -6897,14 +7465,6 @@
             </a:r>
             <a:r>
               <a:rPr lang="en-US" dirty="0"/>
-              <a:t>-critical)…I find this confusing with the actual </a:t>
-            </a:r>
-            <a:r>
-              <a:rPr lang="en-US" i="1" dirty="0"/>
-              <a:t>p</a:t>
-            </a:r>
-            <a:r>
-              <a:rPr lang="en-US" dirty="0"/>
               <a:t> value (what we did in chapter 6)</a:t>
             </a:r>
           </a:p>
@@ -6912,7 +7472,7 @@
             <a:pPr lvl="1"/>
             <a:r>
               <a:rPr lang="en-US" dirty="0"/>
-              <a:t>Better to call it ALPHA (remember type 1 error)</a:t>
+              <a:t>Better to call it ALPHA (remember Type I error)</a:t>
             </a:r>
           </a:p>
         </p:txBody>
@@ -6997,6 +7557,21 @@
               <a:t>So can we figure out what the critical scores would be?</a:t>
             </a:r>
           </a:p>
+          <a:p>
+            <a:pPr lvl="2"/>
+            <a:r>
+              <a:rPr lang="en-US" dirty="0"/>
+              <a:t>Look at the </a:t>
+            </a:r>
+            <a:r>
+              <a:rPr lang="en-US" i="1" dirty="0"/>
+              <a:t>z</a:t>
+            </a:r>
+            <a:r>
+              <a:rPr lang="en-US" dirty="0"/>
+              <a:t> distribution table </a:t>
+            </a:r>
+          </a:p>
         </p:txBody>
       </p:sp>
     </p:spTree>
@@ -7090,7 +7665,7 @@
             <a:pPr lvl="1"/>
             <a:r>
               <a:rPr lang="en-US" dirty="0"/>
-              <a:t>(so we are going to compare </a:t>
+              <a:t>We are going to compare </a:t>
             </a:r>
             <a:r>
               <a:rPr lang="en-US" i="1" dirty="0"/>
@@ -7098,7 +7673,7 @@
             </a:r>
             <a:r>
               <a:rPr lang="en-US" dirty="0"/>
-              <a:t> scores in this section, but later we will switch to other types of statistical distributions)</a:t>
+              <a:t> scores in this section, but later we will switch to other types of statistical distributions</a:t>
             </a:r>
           </a:p>
         </p:txBody>
@@ -7172,38 +7747,37 @@
           <a:lstStyle/>
           <a:p>
             <a:r>
-              <a:rPr lang="en-US"/>
-              <a:t>Step 6. Make a decision.</a:t>
+              <a:rPr lang="en-US" dirty="0"/>
+              <a:t>Step 6. Make a decision</a:t>
             </a:r>
           </a:p>
           <a:p>
             <a:pPr lvl="1"/>
             <a:r>
-              <a:rPr lang="en-US"/>
+              <a:rPr lang="en-US" dirty="0"/>
               <a:t>Reject the null hypothesis </a:t>
             </a:r>
           </a:p>
           <a:p>
             <a:pPr lvl="2"/>
             <a:r>
-              <a:rPr lang="en-US"/>
-              <a:t>Your step 5 found score is in the critical region, farther out than the step 4 cut off score</a:t>
+              <a:rPr lang="en-US" dirty="0"/>
+              <a:t>Your step 5 found score is in the critical region, farther out than the step 4 cutoff score</a:t>
             </a:r>
           </a:p>
           <a:p>
             <a:pPr lvl="1"/>
             <a:r>
-              <a:rPr lang="en-US"/>
+              <a:rPr lang="en-US" dirty="0"/>
               <a:t>Fail to reject the null hypothesis</a:t>
             </a:r>
           </a:p>
           <a:p>
             <a:pPr lvl="2"/>
             <a:r>
-              <a:rPr lang="en-US"/>
-              <a:t>Your step 5 score is NOT in the critical region, less extreme than the step 4 cut off score</a:t>
-            </a:r>
-            <a:endParaRPr lang="en-US" dirty="0"/>
+              <a:rPr lang="en-US" dirty="0"/>
+              <a:t>Your step 5 score is NOT in the critical region, less extreme than the step 4 cutoff score</a:t>
+            </a:r>
           </a:p>
         </p:txBody>
       </p:sp>
@@ -7285,7 +7859,7 @@
             </a:r>
             <a:r>
               <a:rPr lang="en-US" dirty="0"/>
-              <a:t> values are small (or your found scores in step 5 are in the critical region).</a:t>
+              <a:t> values are small (or your found scores in step 5 are in the critical region)</a:t>
             </a:r>
           </a:p>
           <a:p>
@@ -7422,14 +7996,31 @@
             </a:r>
           </a:p>
           <a:p>
-            <a:pPr lvl="2"/>
-            <a:r>
-              <a:rPr lang="en-US" dirty="0"/>
-              <a:t>H0, H1</a:t>
-            </a:r>
-          </a:p>
-          <a:p>
-            <a:pPr lvl="2"/>
+            <a:pPr lvl="1"/>
+            <a:r>
+              <a:rPr lang="en-US" dirty="0"/>
+              <a:t>H</a:t>
+            </a:r>
+            <a:r>
+              <a:rPr lang="en-US" baseline="-25000" dirty="0"/>
+              <a:t>0</a:t>
+            </a:r>
+            <a:r>
+              <a:rPr lang="en-US" dirty="0"/>
+              <a:t> (null hypothesis), H</a:t>
+            </a:r>
+            <a:r>
+              <a:rPr lang="en-US" baseline="-25000" dirty="0"/>
+              <a:t>1</a:t>
+            </a:r>
+            <a:r>
+              <a:rPr lang="en-US" dirty="0"/>
+              <a:t> (research hypothesis)</a:t>
+            </a:r>
+            <a:endParaRPr lang="en-US" baseline="-25000" dirty="0"/>
+          </a:p>
+          <a:p>
+            <a:pPr lvl="1"/>
             <a:r>
               <a:rPr lang="en-US" dirty="0"/>
               <a:t>One-tailed vs. two-tailed tests</a:t>
@@ -7501,37 +8092,36 @@
           <a:lstStyle/>
           <a:p>
             <a:r>
-              <a:rPr lang="en-US"/>
+              <a:rPr lang="en-US" dirty="0"/>
               <a:t>Directional or one-tailed test</a:t>
             </a:r>
           </a:p>
           <a:p>
             <a:pPr lvl="1"/>
             <a:r>
-              <a:rPr lang="en-US"/>
-              <a:t>You predict a change in scores, either up or down.</a:t>
+              <a:rPr lang="en-US" dirty="0"/>
+              <a:t>You predict a change in scores, either up or down</a:t>
             </a:r>
           </a:p>
           <a:p>
             <a:pPr lvl="1"/>
             <a:r>
-              <a:rPr lang="en-US"/>
+              <a:rPr lang="en-US" dirty="0"/>
               <a:t>So you are only using one of the tails of the distribution</a:t>
             </a:r>
           </a:p>
           <a:p>
             <a:r>
-              <a:rPr lang="en-US"/>
+              <a:rPr lang="en-US" dirty="0"/>
               <a:t>Null?</a:t>
             </a:r>
           </a:p>
           <a:p>
             <a:pPr lvl="1"/>
             <a:r>
-              <a:rPr lang="en-US"/>
-              <a:t>Remember the technical definition of the null (it’s the OPPOSITE).</a:t>
-            </a:r>
-            <a:endParaRPr lang="en-US" dirty="0"/>
+              <a:rPr lang="en-US" dirty="0"/>
+              <a:t>Remember the technical definition of the null (it’s the OPPOSITE)</a:t>
+            </a:r>
           </a:p>
         </p:txBody>
       </p:sp>
@@ -7695,14 +8285,14 @@
             <a:pPr lvl="1"/>
             <a:r>
               <a:rPr lang="en-US" dirty="0"/>
-              <a:t>Scores going up:</a:t>
+              <a:t>If you predict scores will be higher:</a:t>
             </a:r>
           </a:p>
           <a:p>
             <a:pPr lvl="2"/>
             <a:r>
               <a:rPr lang="en-US" dirty="0"/>
-              <a:t>Null: sample = &lt; population</a:t>
+              <a:t>Null: sample ≤ population</a:t>
             </a:r>
           </a:p>
           <a:p>
@@ -7716,14 +8306,14 @@
             <a:pPr lvl="1"/>
             <a:r>
               <a:rPr lang="en-US" dirty="0"/>
-              <a:t>Scores going down:</a:t>
+              <a:t>If you predict scores will be lower:</a:t>
             </a:r>
           </a:p>
           <a:p>
             <a:pPr lvl="2"/>
             <a:r>
               <a:rPr lang="en-US" dirty="0"/>
-              <a:t>Null: sample = &gt; population</a:t>
+              <a:t>Null: sample ≥ population</a:t>
             </a:r>
           </a:p>
           <a:p>
@@ -7737,11 +8327,13 @@
             <a:pPr lvl="1"/>
             <a:r>
               <a:rPr lang="en-US" dirty="0"/>
-              <a:t>See how opposites?</a:t>
-            </a:r>
-          </a:p>
-          <a:p>
-            <a:pPr lvl="2"/>
+              <a:t>See how these are opposites?</a:t>
+            </a:r>
+          </a:p>
+          <a:p>
+            <a:pPr marL="384048" lvl="2" indent="0">
+              <a:buNone/>
+            </a:pPr>
             <a:endParaRPr lang="en-US" dirty="0"/>
           </a:p>
         </p:txBody>
@@ -7837,7 +8429,7 @@
             <a:pPr lvl="2"/>
             <a:r>
               <a:rPr lang="en-US" dirty="0"/>
-              <a:t>Research: sample /= population</a:t>
+              <a:t>Research: sample ≠ population</a:t>
             </a:r>
           </a:p>
         </p:txBody>
@@ -7874,6 +8466,376 @@
       </p:grpSpPr>
       <p:sp>
         <p:nvSpPr>
+          <p:cNvPr id="2" name="Title 1"/>
+          <p:cNvSpPr>
+            <a:spLocks noGrp="1"/>
+          </p:cNvSpPr>
+          <p:nvPr>
+            <p:ph type="title"/>
+          </p:nvPr>
+        </p:nvSpPr>
+        <p:spPr/>
+        <p:txBody>
+          <a:bodyPr/>
+          <a:lstStyle/>
+          <a:p>
+            <a:r>
+              <a:rPr lang="en-US"/>
+              <a:t>Back to Hypothesis Testing Steps</a:t>
+            </a:r>
+            <a:endParaRPr lang="en-US" dirty="0"/>
+          </a:p>
+        </p:txBody>
+      </p:sp>
+      <p:sp>
+        <p:nvSpPr>
+          <p:cNvPr id="3" name="Content Placeholder 2"/>
+          <p:cNvSpPr>
+            <a:spLocks noGrp="1"/>
+          </p:cNvSpPr>
+          <p:nvPr>
+            <p:ph idx="1"/>
+          </p:nvPr>
+        </p:nvSpPr>
+        <p:spPr/>
+        <p:txBody>
+          <a:bodyPr/>
+          <a:lstStyle/>
+          <a:p>
+            <a:r>
+              <a:rPr lang="en-US" dirty="0"/>
+              <a:t>Determining critical values/cut off scores</a:t>
+            </a:r>
+          </a:p>
+          <a:p>
+            <a:r>
+              <a:rPr lang="en-US" dirty="0"/>
+              <a:t>Table below shows the </a:t>
+            </a:r>
+            <a:r>
+              <a:rPr lang="en-US" i="1" dirty="0"/>
+              <a:t>z </a:t>
+            </a:r>
+            <a:r>
+              <a:rPr lang="en-US" dirty="0"/>
+              <a:t>cutoff scores for one- and two- tailed tests using </a:t>
+            </a:r>
+            <a:r>
+              <a:rPr lang="en-US" i="1" dirty="0"/>
+              <a:t>p</a:t>
+            </a:r>
+            <a:r>
+              <a:rPr lang="en-US" dirty="0"/>
+              <a:t> &lt; .05 or </a:t>
+            </a:r>
+            <a:r>
+              <a:rPr lang="en-US" i="1" dirty="0"/>
+              <a:t>p</a:t>
+            </a:r>
+            <a:r>
+              <a:rPr lang="en-US" dirty="0"/>
+              <a:t> &lt; .01</a:t>
+            </a:r>
+          </a:p>
+          <a:p>
+            <a:r>
+              <a:rPr lang="en-US" dirty="0"/>
+              <a:t>Understand how we got these from the </a:t>
+            </a:r>
+            <a:r>
+              <a:rPr lang="en-US" i="1" dirty="0"/>
+              <a:t>z </a:t>
+            </a:r>
+            <a:r>
+              <a:rPr lang="en-US" dirty="0"/>
+              <a:t>distribution table</a:t>
+            </a:r>
+          </a:p>
+          <a:p>
+            <a:endParaRPr lang="en-US" dirty="0"/>
+          </a:p>
+        </p:txBody>
+      </p:sp>
+      <p:graphicFrame>
+        <p:nvGraphicFramePr>
+          <p:cNvPr id="4" name="Table 3">
+            <a:extLst>
+              <a:ext uri="{FF2B5EF4-FFF2-40B4-BE49-F238E27FC236}">
+                <a16:creationId xmlns:a16="http://schemas.microsoft.com/office/drawing/2014/main" id="{F12503F3-CAD0-41DE-BAFC-44CA668D36B5}"/>
+              </a:ext>
+            </a:extLst>
+          </p:cNvPr>
+          <p:cNvGraphicFramePr>
+            <a:graphicFrameLocks noGrp="1"/>
+          </p:cNvGraphicFramePr>
+          <p:nvPr>
+            <p:extLst>
+              <p:ext uri="{D42A27DB-BD31-4B8C-83A1-F6EECF244321}">
+                <p14:modId xmlns:p14="http://schemas.microsoft.com/office/powerpoint/2010/main" val="4290259662"/>
+              </p:ext>
+            </p:extLst>
+          </p:nvPr>
+        </p:nvGraphicFramePr>
+        <p:xfrm>
+          <a:off x="1524000" y="4038600"/>
+          <a:ext cx="6096000" cy="1381760"/>
+        </p:xfrm>
+        <a:graphic>
+          <a:graphicData uri="http://schemas.openxmlformats.org/drawingml/2006/table">
+            <a:tbl>
+              <a:tblPr firstRow="1" bandRow="1">
+                <a:tableStyleId>{5C22544A-7EE6-4342-B048-85BDC9FD1C3A}</a:tableStyleId>
+              </a:tblPr>
+              <a:tblGrid>
+                <a:gridCol w="1524000">
+                  <a:extLst>
+                    <a:ext uri="{9D8B030D-6E8A-4147-A177-3AD203B41FA5}">
+                      <a16:colId xmlns:a16="http://schemas.microsoft.com/office/drawing/2014/main" val="566358572"/>
+                    </a:ext>
+                  </a:extLst>
+                </a:gridCol>
+                <a:gridCol w="1524000">
+                  <a:extLst>
+                    <a:ext uri="{9D8B030D-6E8A-4147-A177-3AD203B41FA5}">
+                      <a16:colId xmlns:a16="http://schemas.microsoft.com/office/drawing/2014/main" val="1320779560"/>
+                    </a:ext>
+                  </a:extLst>
+                </a:gridCol>
+                <a:gridCol w="1524000">
+                  <a:extLst>
+                    <a:ext uri="{9D8B030D-6E8A-4147-A177-3AD203B41FA5}">
+                      <a16:colId xmlns:a16="http://schemas.microsoft.com/office/drawing/2014/main" val="3292801998"/>
+                    </a:ext>
+                  </a:extLst>
+                </a:gridCol>
+                <a:gridCol w="1524000">
+                  <a:extLst>
+                    <a:ext uri="{9D8B030D-6E8A-4147-A177-3AD203B41FA5}">
+                      <a16:colId xmlns:a16="http://schemas.microsoft.com/office/drawing/2014/main" val="2502853281"/>
+                    </a:ext>
+                  </a:extLst>
+                </a:gridCol>
+              </a:tblGrid>
+              <a:tr h="370840">
+                <a:tc>
+                  <a:txBody>
+                    <a:bodyPr/>
+                    <a:lstStyle/>
+                    <a:p>
+                      <a:endParaRPr lang="en-US" dirty="0"/>
+                    </a:p>
+                  </a:txBody>
+                  <a:tcPr/>
+                </a:tc>
+                <a:tc>
+                  <a:txBody>
+                    <a:bodyPr/>
+                    <a:lstStyle/>
+                    <a:p>
+                      <a:r>
+                        <a:rPr lang="en-US" dirty="0"/>
+                        <a:t>One-Tailed Test (greater)</a:t>
+                      </a:r>
+                    </a:p>
+                  </a:txBody>
+                  <a:tcPr/>
+                </a:tc>
+                <a:tc>
+                  <a:txBody>
+                    <a:bodyPr/>
+                    <a:lstStyle/>
+                    <a:p>
+                      <a:r>
+                        <a:rPr lang="en-US" dirty="0"/>
+                        <a:t>One-Tailed Test (less) </a:t>
+                      </a:r>
+                    </a:p>
+                  </a:txBody>
+                  <a:tcPr/>
+                </a:tc>
+                <a:tc>
+                  <a:txBody>
+                    <a:bodyPr/>
+                    <a:lstStyle/>
+                    <a:p>
+                      <a:r>
+                        <a:rPr lang="en-US" dirty="0"/>
+                        <a:t>Two-Tailed Test</a:t>
+                      </a:r>
+                    </a:p>
+                  </a:txBody>
+                  <a:tcPr/>
+                </a:tc>
+                <a:extLst>
+                  <a:ext uri="{0D108BD9-81ED-4DB2-BD59-A6C34878D82A}">
+                    <a16:rowId xmlns:a16="http://schemas.microsoft.com/office/drawing/2014/main" val="1169457957"/>
+                  </a:ext>
+                </a:extLst>
+              </a:tr>
+              <a:tr h="370840">
+                <a:tc>
+                  <a:txBody>
+                    <a:bodyPr/>
+                    <a:lstStyle/>
+                    <a:p>
+                      <a:r>
+                        <a:rPr lang="en-US" i="1" dirty="0"/>
+                        <a:t>p</a:t>
+                      </a:r>
+                      <a:r>
+                        <a:rPr lang="en-US" i="0" dirty="0"/>
+                        <a:t> &lt; .05</a:t>
+                      </a:r>
+                      <a:endParaRPr lang="en-US" i="1" dirty="0"/>
+                    </a:p>
+                  </a:txBody>
+                  <a:tcPr/>
+                </a:tc>
+                <a:tc>
+                  <a:txBody>
+                    <a:bodyPr/>
+                    <a:lstStyle/>
+                    <a:p>
+                      <a:r>
+                        <a:rPr lang="en-US" dirty="0"/>
+                        <a:t>1.64</a:t>
+                      </a:r>
+                    </a:p>
+                  </a:txBody>
+                  <a:tcPr/>
+                </a:tc>
+                <a:tc>
+                  <a:txBody>
+                    <a:bodyPr/>
+                    <a:lstStyle/>
+                    <a:p>
+                      <a:r>
+                        <a:rPr lang="en-US" dirty="0"/>
+                        <a:t>-1.64</a:t>
+                      </a:r>
+                    </a:p>
+                  </a:txBody>
+                  <a:tcPr/>
+                </a:tc>
+                <a:tc>
+                  <a:txBody>
+                    <a:bodyPr/>
+                    <a:lstStyle/>
+                    <a:p>
+                      <a:r>
+                        <a:rPr lang="en-US" dirty="0"/>
+                        <a:t>±1.96</a:t>
+                      </a:r>
+                    </a:p>
+                  </a:txBody>
+                  <a:tcPr/>
+                </a:tc>
+                <a:extLst>
+                  <a:ext uri="{0D108BD9-81ED-4DB2-BD59-A6C34878D82A}">
+                    <a16:rowId xmlns:a16="http://schemas.microsoft.com/office/drawing/2014/main" val="2235811658"/>
+                  </a:ext>
+                </a:extLst>
+              </a:tr>
+              <a:tr h="370840">
+                <a:tc>
+                  <a:txBody>
+                    <a:bodyPr/>
+                    <a:lstStyle/>
+                    <a:p>
+                      <a:r>
+                        <a:rPr lang="en-US" i="1" dirty="0"/>
+                        <a:t>p </a:t>
+                      </a:r>
+                      <a:r>
+                        <a:rPr lang="en-US" i="0" dirty="0"/>
+                        <a:t>&lt; .01</a:t>
+                      </a:r>
+                      <a:endParaRPr lang="en-US" i="1" dirty="0"/>
+                    </a:p>
+                  </a:txBody>
+                  <a:tcPr/>
+                </a:tc>
+                <a:tc>
+                  <a:txBody>
+                    <a:bodyPr/>
+                    <a:lstStyle/>
+                    <a:p>
+                      <a:r>
+                        <a:rPr lang="en-US" dirty="0"/>
+                        <a:t>2.33</a:t>
+                      </a:r>
+                    </a:p>
+                  </a:txBody>
+                  <a:tcPr/>
+                </a:tc>
+                <a:tc>
+                  <a:txBody>
+                    <a:bodyPr/>
+                    <a:lstStyle/>
+                    <a:p>
+                      <a:r>
+                        <a:rPr lang="en-US" dirty="0"/>
+                        <a:t>-2.33</a:t>
+                      </a:r>
+                    </a:p>
+                  </a:txBody>
+                  <a:tcPr/>
+                </a:tc>
+                <a:tc>
+                  <a:txBody>
+                    <a:bodyPr/>
+                    <a:lstStyle/>
+                    <a:p>
+                      <a:r>
+                        <a:rPr lang="en-US" dirty="0"/>
+                        <a:t>±2.58</a:t>
+                      </a:r>
+                    </a:p>
+                  </a:txBody>
+                  <a:tcPr/>
+                </a:tc>
+                <a:extLst>
+                  <a:ext uri="{0D108BD9-81ED-4DB2-BD59-A6C34878D82A}">
+                    <a16:rowId xmlns:a16="http://schemas.microsoft.com/office/drawing/2014/main" val="1269431379"/>
+                  </a:ext>
+                </a:extLst>
+              </a:tr>
+            </a:tbl>
+          </a:graphicData>
+        </a:graphic>
+      </p:graphicFrame>
+    </p:spTree>
+    <p:extLst>
+      <p:ext uri="{BB962C8B-B14F-4D97-AF65-F5344CB8AC3E}">
+        <p14:creationId xmlns:p14="http://schemas.microsoft.com/office/powerpoint/2010/main" val="861384290"/>
+      </p:ext>
+    </p:extLst>
+  </p:cSld>
+  <p:clrMapOvr>
+    <a:masterClrMapping/>
+  </p:clrMapOvr>
+</p:sld>
+</file>
+
+<file path=ppt/slides/slide33.xml><?xml version="1.0" encoding="utf-8"?>
+<p:sld xmlns:a="http://schemas.openxmlformats.org/drawingml/2006/main" xmlns:r="http://schemas.openxmlformats.org/officeDocument/2006/relationships" xmlns:p="http://schemas.openxmlformats.org/presentationml/2006/main">
+  <p:cSld>
+    <p:spTree>
+      <p:nvGrpSpPr>
+        <p:cNvPr id="1" name=""/>
+        <p:cNvGrpSpPr/>
+        <p:nvPr/>
+      </p:nvGrpSpPr>
+      <p:grpSpPr>
+        <a:xfrm>
+          <a:off x="0" y="0"/>
+          <a:ext cx="0" cy="0"/>
+          <a:chOff x="0" y="0"/>
+          <a:chExt cx="0" cy="0"/>
+        </a:xfrm>
+      </p:grpSpPr>
+      <p:sp>
+        <p:nvSpPr>
           <p:cNvPr id="60417" name="Title 1"/>
           <p:cNvSpPr>
             <a:spLocks noGrp="1"/>
@@ -7913,13 +8875,21 @@
           <a:p>
             <a:r>
               <a:rPr lang="en-US" dirty="0"/>
-              <a:t>Food labeling has become a targeted campaign to help with the obesity problem found in many states. Twenty-five participants were asked to estimate how many calories meals labeled “organic” had and guessed an average of 525. The real meals had an average 650 calories with a standard deviation of 250 calories.</a:t>
-            </a:r>
-          </a:p>
-          <a:p>
-            <a:r>
-              <a:rPr lang="en-US" dirty="0"/>
-              <a:t>Would this be a significant difference using p &lt; .05?</a:t>
+              <a:t>Food labeling has become a targeted campaign to help with the obesity problem found in many states. Twenty-five participants were asked to estimate how many calories meals labeled as “organic” had. They guessed an average of 525. The real meals had an average 650 calories with a standard deviation of 250 calories.</a:t>
+            </a:r>
+          </a:p>
+          <a:p>
+            <a:r>
+              <a:rPr lang="en-US" dirty="0"/>
+              <a:t>Would this be a significant difference using </a:t>
+            </a:r>
+            <a:r>
+              <a:rPr lang="en-US" i="1" dirty="0"/>
+              <a:t>p</a:t>
+            </a:r>
+            <a:r>
+              <a:rPr lang="en-US" dirty="0"/>
+              <a:t> &lt; .05?</a:t>
             </a:r>
           </a:p>
           <a:p>
@@ -8001,7 +8971,19 @@
           <a:p>
             <a:r>
               <a:rPr lang="en-US" dirty="0"/>
-              <a:t>Remember the formula for sample tests requires you to use standard error</a:t>
+              <a:t>Remember the formula for sample tests requires you to use standard error (</a:t>
+            </a:r>
+            <a:r>
+              <a:rPr lang="el-GR" dirty="0"/>
+              <a:t>σ</a:t>
+            </a:r>
+            <a:r>
+              <a:rPr lang="en-US" i="1" baseline="-25000" dirty="0"/>
+              <a:t>M</a:t>
+            </a:r>
+            <a:r>
+              <a:rPr lang="en-US" dirty="0"/>
+              <a:t>)</a:t>
             </a:r>
           </a:p>
           <a:p>
@@ -8190,9 +9172,13 @@
             </a:r>
             <a:r>
               <a:rPr lang="en-US" dirty="0" err="1"/>
-              <a:t>uM</a:t>
-            </a:r>
-            <a:endParaRPr lang="en-US" dirty="0"/>
+              <a:t>μ</a:t>
+            </a:r>
+            <a:r>
+              <a:rPr lang="en-US" i="1" baseline="-25000" dirty="0" err="1"/>
+              <a:t>M</a:t>
+            </a:r>
+            <a:endParaRPr lang="en-US" i="1" baseline="-25000" dirty="0"/>
           </a:p>
           <a:p>
             <a:pPr lvl="1"/>
@@ -8205,7 +9191,11 @@
             <a:pPr lvl="1"/>
             <a:r>
               <a:rPr lang="en-US" dirty="0"/>
-              <a:t>Sample mean: M</a:t>
+              <a:t>Sample mean: </a:t>
+            </a:r>
+            <a:r>
+              <a:rPr lang="en-US" i="1" dirty="0"/>
+              <a:t>M</a:t>
             </a:r>
           </a:p>
           <a:p>
@@ -8216,12 +9206,46 @@
             </a:r>
             <a:r>
               <a:rPr lang="en-US" dirty="0" err="1"/>
-              <a:t>σM</a:t>
-            </a:r>
-            <a:endParaRPr lang="en-US" dirty="0"/>
-          </a:p>
-        </p:txBody>
-      </p:sp>
+              <a:t>σ</a:t>
+            </a:r>
+            <a:r>
+              <a:rPr lang="en-US" i="1" baseline="-25000" dirty="0" err="1"/>
+              <a:t>M</a:t>
+            </a:r>
+            <a:endParaRPr lang="en-US" i="1" baseline="-25000" dirty="0"/>
+          </a:p>
+        </p:txBody>
+      </p:sp>
+      <p:pic>
+        <p:nvPicPr>
+          <p:cNvPr id="4" name="Picture 3">
+            <a:extLst>
+              <a:ext uri="{FF2B5EF4-FFF2-40B4-BE49-F238E27FC236}">
+                <a16:creationId xmlns:a16="http://schemas.microsoft.com/office/drawing/2014/main" id="{AF70E3EC-C8D7-431D-92AC-6B9EEBE596E0}"/>
+              </a:ext>
+            </a:extLst>
+          </p:cNvPr>
+          <p:cNvPicPr>
+            <a:picLocks noChangeAspect="1"/>
+          </p:cNvPicPr>
+          <p:nvPr/>
+        </p:nvPicPr>
+        <p:blipFill>
+          <a:blip r:embed="rId2"/>
+          <a:stretch>
+            <a:fillRect/>
+          </a:stretch>
+        </p:blipFill>
+        <p:spPr>
+          <a:xfrm>
+            <a:off x="3525715" y="4267200"/>
+            <a:ext cx="2092569" cy="1295400"/>
+          </a:xfrm>
+          <a:prstGeom prst="rect">
+            <a:avLst/>
+          </a:prstGeom>
+        </p:spPr>
+      </p:pic>
     </p:spTree>
     <p:extLst>
       <p:ext uri="{BB962C8B-B14F-4D97-AF65-F5344CB8AC3E}">
@@ -8466,41 +9490,92 @@
           <a:lstStyle/>
           <a:p>
             <a:r>
-              <a:rPr lang="en-US"/>
+              <a:rPr lang="en-US" dirty="0"/>
               <a:t>Label:</a:t>
             </a:r>
           </a:p>
           <a:p>
             <a:pPr lvl="1"/>
             <a:r>
-              <a:rPr lang="en-US"/>
-              <a:t>Population mean uM</a:t>
-            </a:r>
+              <a:rPr lang="en-US" dirty="0"/>
+              <a:t>Population mean: </a:t>
+            </a:r>
+            <a:r>
+              <a:rPr lang="en-US" dirty="0" err="1"/>
+              <a:t>μ</a:t>
+            </a:r>
+            <a:r>
+              <a:rPr lang="en-US" i="1" baseline="-25000" dirty="0" err="1"/>
+              <a:t>M</a:t>
+            </a:r>
+            <a:endParaRPr lang="en-US" i="1" baseline="-25000" dirty="0"/>
           </a:p>
           <a:p>
             <a:pPr lvl="1"/>
             <a:r>
-              <a:rPr lang="en-US"/>
+              <a:rPr lang="en-US" dirty="0"/>
               <a:t>Population standard deviation: σ</a:t>
             </a:r>
           </a:p>
           <a:p>
             <a:pPr lvl="1"/>
             <a:r>
-              <a:rPr lang="en-US"/>
-              <a:t>Sample mean: M</a:t>
+              <a:rPr lang="en-US" dirty="0"/>
+              <a:t>Sample mean: </a:t>
+            </a:r>
+            <a:r>
+              <a:rPr lang="en-US" i="1" dirty="0"/>
+              <a:t>M</a:t>
             </a:r>
           </a:p>
           <a:p>
             <a:pPr lvl="1"/>
             <a:r>
-              <a:rPr lang="en-US"/>
-              <a:t>Standard error: σM</a:t>
-            </a:r>
-            <a:endParaRPr lang="en-US" dirty="0"/>
-          </a:p>
-        </p:txBody>
-      </p:sp>
+              <a:rPr lang="en-US" dirty="0"/>
+              <a:t>Standard error: </a:t>
+            </a:r>
+            <a:r>
+              <a:rPr lang="en-US" dirty="0" err="1"/>
+              <a:t>σ</a:t>
+            </a:r>
+            <a:r>
+              <a:rPr lang="en-US" i="1" baseline="-25000" dirty="0" err="1"/>
+              <a:t>M</a:t>
+            </a:r>
+            <a:endParaRPr lang="en-US" i="1" baseline="-25000" dirty="0"/>
+          </a:p>
+        </p:txBody>
+      </p:sp>
+      <p:pic>
+        <p:nvPicPr>
+          <p:cNvPr id="4" name="Picture 3">
+            <a:extLst>
+              <a:ext uri="{FF2B5EF4-FFF2-40B4-BE49-F238E27FC236}">
+                <a16:creationId xmlns:a16="http://schemas.microsoft.com/office/drawing/2014/main" id="{48A22063-68A3-47DE-A854-F60C0A255156}"/>
+              </a:ext>
+            </a:extLst>
+          </p:cNvPr>
+          <p:cNvPicPr>
+            <a:picLocks noChangeAspect="1"/>
+          </p:cNvPicPr>
+          <p:nvPr/>
+        </p:nvPicPr>
+        <p:blipFill>
+          <a:blip r:embed="rId2"/>
+          <a:stretch>
+            <a:fillRect/>
+          </a:stretch>
+        </p:blipFill>
+        <p:spPr>
+          <a:xfrm>
+            <a:off x="3525715" y="4267200"/>
+            <a:ext cx="2092569" cy="1295400"/>
+          </a:xfrm>
+          <a:prstGeom prst="rect">
+            <a:avLst/>
+          </a:prstGeom>
+        </p:spPr>
+      </p:pic>
     </p:spTree>
     <p:extLst>
       <p:ext uri="{BB962C8B-B14F-4D97-AF65-F5344CB8AC3E}">

</xml_diff>